<commit_message>
Apresentacao 2 Kafka connect
</commit_message>
<xml_diff>
--- a/Apresentação2.pptx
+++ b/Apresentação2.pptx
@@ -6,21 +6,21 @@
   </p:sldMasterIdLst>
   <p:sldIdLst>
     <p:sldId id="256" r:id="rId2"/>
-    <p:sldId id="258" r:id="rId3"/>
-    <p:sldId id="257" r:id="rId4"/>
-    <p:sldId id="259" r:id="rId5"/>
-    <p:sldId id="260" r:id="rId6"/>
-    <p:sldId id="261" r:id="rId7"/>
-    <p:sldId id="262" r:id="rId8"/>
-    <p:sldId id="263" r:id="rId9"/>
-    <p:sldId id="264" r:id="rId10"/>
-    <p:sldId id="265" r:id="rId11"/>
-    <p:sldId id="266" r:id="rId12"/>
-    <p:sldId id="267" r:id="rId13"/>
-    <p:sldId id="268" r:id="rId14"/>
-    <p:sldId id="271" r:id="rId15"/>
-    <p:sldId id="272" r:id="rId16"/>
-    <p:sldId id="269" r:id="rId17"/>
+    <p:sldId id="272" r:id="rId3"/>
+    <p:sldId id="269" r:id="rId4"/>
+    <p:sldId id="258" r:id="rId5"/>
+    <p:sldId id="257" r:id="rId6"/>
+    <p:sldId id="259" r:id="rId7"/>
+    <p:sldId id="260" r:id="rId8"/>
+    <p:sldId id="261" r:id="rId9"/>
+    <p:sldId id="262" r:id="rId10"/>
+    <p:sldId id="263" r:id="rId11"/>
+    <p:sldId id="264" r:id="rId12"/>
+    <p:sldId id="265" r:id="rId13"/>
+    <p:sldId id="266" r:id="rId14"/>
+    <p:sldId id="267" r:id="rId15"/>
+    <p:sldId id="268" r:id="rId16"/>
+    <p:sldId id="271" r:id="rId17"/>
     <p:sldId id="270" r:id="rId18"/>
   </p:sldIdLst>
   <p:sldSz cx="12192000" cy="6858000"/>
@@ -120,6 +120,11 @@
       </a:defRPr>
     </a:lvl9pPr>
   </p:defaultTextStyle>
+  <p:extLst>
+    <p:ext uri="{EFAFB233-063F-42B5-8137-9DF3F51BA10A}">
+      <p15:sldGuideLst xmlns:p15="http://schemas.microsoft.com/office/powerpoint/2012/main"/>
+    </p:ext>
+  </p:extLst>
 </p:presentation>
 </file>
 
@@ -254,7 +259,7 @@
           <a:p>
             <a:fld id="{DF7CAEFB-97D1-495A-A570-66E8B46874CD}" type="datetimeFigureOut">
               <a:rPr lang="pt-BR" smtClean="0"/>
-              <a:t>17/03/2021</a:t>
+              <a:t>23/03/2021</a:t>
             </a:fld>
             <a:endParaRPr lang="pt-BR"/>
           </a:p>
@@ -424,7 +429,7 @@
           <a:p>
             <a:fld id="{DF7CAEFB-97D1-495A-A570-66E8B46874CD}" type="datetimeFigureOut">
               <a:rPr lang="pt-BR" smtClean="0"/>
-              <a:t>17/03/2021</a:t>
+              <a:t>23/03/2021</a:t>
             </a:fld>
             <a:endParaRPr lang="pt-BR"/>
           </a:p>
@@ -604,7 +609,7 @@
           <a:p>
             <a:fld id="{DF7CAEFB-97D1-495A-A570-66E8B46874CD}" type="datetimeFigureOut">
               <a:rPr lang="pt-BR" smtClean="0"/>
-              <a:t>17/03/2021</a:t>
+              <a:t>23/03/2021</a:t>
             </a:fld>
             <a:endParaRPr lang="pt-BR"/>
           </a:p>
@@ -774,7 +779,7 @@
           <a:p>
             <a:fld id="{DF7CAEFB-97D1-495A-A570-66E8B46874CD}" type="datetimeFigureOut">
               <a:rPr lang="pt-BR" smtClean="0"/>
-              <a:t>17/03/2021</a:t>
+              <a:t>23/03/2021</a:t>
             </a:fld>
             <a:endParaRPr lang="pt-BR"/>
           </a:p>
@@ -1020,7 +1025,7 @@
           <a:p>
             <a:fld id="{DF7CAEFB-97D1-495A-A570-66E8B46874CD}" type="datetimeFigureOut">
               <a:rPr lang="pt-BR" smtClean="0"/>
-              <a:t>17/03/2021</a:t>
+              <a:t>23/03/2021</a:t>
             </a:fld>
             <a:endParaRPr lang="pt-BR"/>
           </a:p>
@@ -1252,7 +1257,7 @@
           <a:p>
             <a:fld id="{DF7CAEFB-97D1-495A-A570-66E8B46874CD}" type="datetimeFigureOut">
               <a:rPr lang="pt-BR" smtClean="0"/>
-              <a:t>17/03/2021</a:t>
+              <a:t>23/03/2021</a:t>
             </a:fld>
             <a:endParaRPr lang="pt-BR"/>
           </a:p>
@@ -1619,7 +1624,7 @@
           <a:p>
             <a:fld id="{DF7CAEFB-97D1-495A-A570-66E8B46874CD}" type="datetimeFigureOut">
               <a:rPr lang="pt-BR" smtClean="0"/>
-              <a:t>17/03/2021</a:t>
+              <a:t>23/03/2021</a:t>
             </a:fld>
             <a:endParaRPr lang="pt-BR"/>
           </a:p>
@@ -1737,7 +1742,7 @@
           <a:p>
             <a:fld id="{DF7CAEFB-97D1-495A-A570-66E8B46874CD}" type="datetimeFigureOut">
               <a:rPr lang="pt-BR" smtClean="0"/>
-              <a:t>17/03/2021</a:t>
+              <a:t>23/03/2021</a:t>
             </a:fld>
             <a:endParaRPr lang="pt-BR"/>
           </a:p>
@@ -1832,7 +1837,7 @@
           <a:p>
             <a:fld id="{DF7CAEFB-97D1-495A-A570-66E8B46874CD}" type="datetimeFigureOut">
               <a:rPr lang="pt-BR" smtClean="0"/>
-              <a:t>17/03/2021</a:t>
+              <a:t>23/03/2021</a:t>
             </a:fld>
             <a:endParaRPr lang="pt-BR"/>
           </a:p>
@@ -2109,7 +2114,7 @@
           <a:p>
             <a:fld id="{DF7CAEFB-97D1-495A-A570-66E8B46874CD}" type="datetimeFigureOut">
               <a:rPr lang="pt-BR" smtClean="0"/>
-              <a:t>17/03/2021</a:t>
+              <a:t>23/03/2021</a:t>
             </a:fld>
             <a:endParaRPr lang="pt-BR"/>
           </a:p>
@@ -2362,7 +2367,7 @@
           <a:p>
             <a:fld id="{DF7CAEFB-97D1-495A-A570-66E8B46874CD}" type="datetimeFigureOut">
               <a:rPr lang="pt-BR" smtClean="0"/>
-              <a:t>17/03/2021</a:t>
+              <a:t>23/03/2021</a:t>
             </a:fld>
             <a:endParaRPr lang="pt-BR"/>
           </a:p>
@@ -2575,7 +2580,7 @@
           <a:p>
             <a:fld id="{DF7CAEFB-97D1-495A-A570-66E8B46874CD}" type="datetimeFigureOut">
               <a:rPr lang="pt-BR" smtClean="0"/>
-              <a:t>17/03/2021</a:t>
+              <a:t>23/03/2021</a:t>
             </a:fld>
             <a:endParaRPr lang="pt-BR"/>
           </a:p>
@@ -3086,6 +3091,8 @@
               </a:rPr>
               <a:t>Apresentação 2</a:t>
             </a:r>
+          </a:p>
+          <a:p>
             <a:endParaRPr lang="pt-BR" b="1" dirty="0" smtClean="0">
               <a:solidFill>
                 <a:srgbClr val="FFFF00"/>
@@ -3093,28 +3100,13 @@
             </a:endParaRPr>
           </a:p>
           <a:p>
-            <a:endParaRPr lang="pt-BR" b="1" dirty="0" smtClean="0">
-              <a:solidFill>
-                <a:srgbClr val="FFFF00"/>
-              </a:solidFill>
-            </a:endParaRPr>
-          </a:p>
-          <a:p>
             <a:r>
               <a:rPr lang="pt-BR" b="1" dirty="0" smtClean="0">
                 <a:solidFill>
                   <a:srgbClr val="FFFF00"/>
                 </a:solidFill>
               </a:rPr>
-              <a:t>Desafio </a:t>
-            </a:r>
-            <a:r>
-              <a:rPr lang="pt-BR" b="1" dirty="0" smtClean="0">
-                <a:solidFill>
-                  <a:srgbClr val="FFFF00"/>
-                </a:solidFill>
-              </a:rPr>
-              <a:t>PRI Tech </a:t>
+              <a:t>Desafio PRI Tech </a:t>
             </a:r>
             <a:r>
               <a:rPr lang="pt-BR" b="1" dirty="0" err="1" smtClean="0">
@@ -3166,13 +3158,13 @@
   <p:clrMapOvr>
     <a:masterClrMapping/>
   </p:clrMapOvr>
-  <mc:AlternateContent xmlns:mc="http://schemas.openxmlformats.org/markup-compatibility/2006">
-    <mc:Choice xmlns:p15="http://schemas.microsoft.com/office/powerpoint/2012/main" Requires="p15">
+  <mc:AlternateContent xmlns:mc="http://schemas.openxmlformats.org/markup-compatibility/2006" xmlns:p15="http://schemas.microsoft.com/office/powerpoint/2012/main">
+    <mc:Choice Requires="p15">
       <p:transition xmlns:p14="http://schemas.microsoft.com/office/powerpoint/2010/main" spd="slow" p14:dur="6000">
         <p15:prstTrans prst="curtains"/>
       </p:transition>
     </mc:Choice>
-    <mc:Fallback>
+    <mc:Fallback xmlns="">
       <p:transition spd="slow">
         <p:fade/>
       </p:transition>
@@ -3245,139 +3237,8 @@
         </p:nvSpPr>
         <p:spPr>
           <a:xfrm>
-            <a:off x="2441881" y="0"/>
-            <a:ext cx="7117080" cy="953588"/>
-          </a:xfrm>
-          <a:prstGeom prst="rect">
-            <a:avLst/>
-          </a:prstGeom>
-          <a:effectLst>
-            <a:reflection endPos="0" dir="5400000" sy="-100000" algn="bl" rotWithShape="0"/>
-          </a:effectLst>
-          <a:scene3d>
-            <a:camera prst="orthographicFront"/>
-            <a:lightRig rig="threePt" dir="t"/>
-          </a:scene3d>
-          <a:sp3d prstMaterial="dkEdge">
-            <a:bevelB w="0"/>
-          </a:sp3d>
-        </p:spPr>
-        <p:txBody>
-          <a:bodyPr vert="horz" lIns="91440" tIns="45720" rIns="91440" bIns="45720" rtlCol="0" anchor="b">
-            <a:normAutofit fontScale="77500" lnSpcReduction="20000"/>
-          </a:bodyPr>
-          <a:lstStyle>
-            <a:lvl1pPr algn="ctr" defTabSz="914400" rtl="0" eaLnBrk="1" latinLnBrk="0" hangingPunct="1">
-              <a:lnSpc>
-                <a:spcPct val="90000"/>
-              </a:lnSpc>
-              <a:spcBef>
-                <a:spcPct val="0"/>
-              </a:spcBef>
-              <a:buNone/>
-              <a:defRPr sz="6000" kern="1200">
-                <a:solidFill>
-                  <a:schemeClr val="tx1"/>
-                </a:solidFill>
-                <a:latin typeface="+mj-lt"/>
-                <a:ea typeface="+mj-ea"/>
-                <a:cs typeface="+mj-cs"/>
-              </a:defRPr>
-            </a:lvl1pPr>
-          </a:lstStyle>
-          <a:p>
-            <a:r>
-              <a:rPr lang="pt-BR" b="1" dirty="0" smtClean="0">
-                <a:solidFill>
-                  <a:srgbClr val="FFFF00"/>
-                </a:solidFill>
-              </a:rPr>
-              <a:t>Service </a:t>
-            </a:r>
-            <a:r>
-              <a:rPr lang="pt-BR" b="1" dirty="0" err="1" smtClean="0">
-                <a:solidFill>
-                  <a:srgbClr val="FFFF00"/>
-                </a:solidFill>
-              </a:rPr>
-              <a:t>Command</a:t>
-            </a:r>
-            <a:r>
-              <a:rPr lang="pt-BR" b="1" dirty="0" smtClean="0">
-                <a:solidFill>
-                  <a:srgbClr val="FFFF00"/>
-                </a:solidFill>
-              </a:rPr>
-              <a:t> Response </a:t>
-            </a:r>
-            <a:endParaRPr lang="pt-BR" b="1" dirty="0" smtClean="0">
-              <a:solidFill>
-                <a:srgbClr val="FFFF00"/>
-              </a:solidFill>
-            </a:endParaRPr>
-          </a:p>
-        </p:txBody>
-      </p:sp>
-      <p:pic>
-        <p:nvPicPr>
-          <p:cNvPr id="2" name="Imagem 1"/>
-          <p:cNvPicPr>
-            <a:picLocks noChangeAspect="1"/>
-          </p:cNvPicPr>
-          <p:nvPr/>
-        </p:nvPicPr>
-        <p:blipFill>
-          <a:blip r:embed="rId3"/>
-          <a:stretch>
-            <a:fillRect/>
-          </a:stretch>
-        </p:blipFill>
-        <p:spPr>
-          <a:xfrm>
-            <a:off x="6281827" y="1188719"/>
-            <a:ext cx="5383305" cy="2495006"/>
-          </a:xfrm>
-          <a:prstGeom prst="rect">
-            <a:avLst/>
-          </a:prstGeom>
-        </p:spPr>
-      </p:pic>
-      <p:pic>
-        <p:nvPicPr>
-          <p:cNvPr id="3" name="Imagem 2"/>
-          <p:cNvPicPr>
-            <a:picLocks noChangeAspect="1"/>
-          </p:cNvPicPr>
-          <p:nvPr/>
-        </p:nvPicPr>
-        <p:blipFill>
-          <a:blip r:embed="rId4"/>
-          <a:stretch>
-            <a:fillRect/>
-          </a:stretch>
-        </p:blipFill>
-        <p:spPr>
-          <a:xfrm>
-            <a:off x="196304" y="1188719"/>
-            <a:ext cx="5889219" cy="5277587"/>
-          </a:xfrm>
-          <a:prstGeom prst="rect">
-            <a:avLst/>
-          </a:prstGeom>
-        </p:spPr>
-      </p:pic>
-      <p:sp>
-        <p:nvSpPr>
-          <p:cNvPr id="6" name="Título 1"/>
-          <p:cNvSpPr txBox="1">
-            <a:spLocks/>
-          </p:cNvSpPr>
-          <p:nvPr/>
-        </p:nvSpPr>
-        <p:spPr>
-          <a:xfrm>
-            <a:off x="855083" y="542425"/>
-            <a:ext cx="2589053" cy="692331"/>
+            <a:off x="720635" y="117567"/>
+            <a:ext cx="10515600" cy="953588"/>
           </a:xfrm>
           <a:prstGeom prst="rect">
             <a:avLst/>
@@ -3418,113 +3279,113 @@
           </a:lstStyle>
           <a:p>
             <a:r>
-              <a:rPr lang="pt-BR" sz="2800" b="1" dirty="0" smtClean="0">
+              <a:rPr lang="pt-BR" b="1" dirty="0" err="1" smtClean="0">
                 <a:solidFill>
                   <a:srgbClr val="FFFF00"/>
                 </a:solidFill>
               </a:rPr>
-              <a:t>Antes</a:t>
-            </a:r>
-            <a:r>
-              <a:rPr lang="pt-BR" sz="2800" b="1" dirty="0" smtClean="0">
+              <a:t>Domain.Commands</a:t>
+            </a:r>
+            <a:r>
+              <a:rPr lang="pt-BR" b="1" dirty="0" smtClean="0">
                 <a:solidFill>
                   <a:srgbClr val="FFFF00"/>
                 </a:solidFill>
               </a:rPr>
               <a:t> </a:t>
             </a:r>
-            <a:endParaRPr lang="pt-BR" sz="2800" b="1" dirty="0" smtClean="0">
-              <a:solidFill>
-                <a:srgbClr val="FFFF00"/>
-              </a:solidFill>
-            </a:endParaRPr>
-          </a:p>
-        </p:txBody>
-      </p:sp>
-      <p:sp>
-        <p:nvSpPr>
-          <p:cNvPr id="8" name="Título 1"/>
-          <p:cNvSpPr txBox="1">
-            <a:spLocks/>
-          </p:cNvSpPr>
-          <p:nvPr/>
-        </p:nvSpPr>
-        <p:spPr>
-          <a:xfrm>
-            <a:off x="8264435" y="542426"/>
-            <a:ext cx="2589053" cy="692331"/>
-          </a:xfrm>
-          <a:prstGeom prst="rect">
-            <a:avLst/>
-          </a:prstGeom>
-          <a:effectLst>
-            <a:reflection endPos="0" dir="5400000" sy="-100000" algn="bl" rotWithShape="0"/>
-          </a:effectLst>
-          <a:scene3d>
-            <a:camera prst="orthographicFront"/>
-            <a:lightRig rig="threePt" dir="t"/>
-          </a:scene3d>
-          <a:sp3d prstMaterial="dkEdge">
-            <a:bevelB w="0"/>
-          </a:sp3d>
-        </p:spPr>
-        <p:txBody>
-          <a:bodyPr vert="horz" lIns="91440" tIns="45720" rIns="91440" bIns="45720" rtlCol="0" anchor="b">
-            <a:normAutofit/>
-          </a:bodyPr>
-          <a:lstStyle>
-            <a:lvl1pPr algn="ctr" defTabSz="914400" rtl="0" eaLnBrk="1" latinLnBrk="0" hangingPunct="1">
-              <a:lnSpc>
-                <a:spcPct val="90000"/>
-              </a:lnSpc>
-              <a:spcBef>
-                <a:spcPct val="0"/>
-              </a:spcBef>
-              <a:buNone/>
-              <a:defRPr sz="6000" kern="1200">
-                <a:solidFill>
-                  <a:schemeClr val="tx1"/>
-                </a:solidFill>
-                <a:latin typeface="+mj-lt"/>
-                <a:ea typeface="+mj-ea"/>
-                <a:cs typeface="+mj-cs"/>
-              </a:defRPr>
-            </a:lvl1pPr>
-          </a:lstStyle>
-          <a:p>
-            <a:r>
-              <a:rPr lang="pt-BR" sz="2800" b="1" dirty="0" smtClean="0">
-                <a:solidFill>
-                  <a:srgbClr val="FFFF00"/>
-                </a:solidFill>
-              </a:rPr>
-              <a:t>Depois </a:t>
-            </a:r>
-            <a:endParaRPr lang="pt-BR" sz="2800" b="1" dirty="0" smtClean="0">
-              <a:solidFill>
-                <a:srgbClr val="FFFF00"/>
-              </a:solidFill>
-            </a:endParaRPr>
-          </a:p>
-        </p:txBody>
-      </p:sp>
+          </a:p>
+        </p:txBody>
+      </p:sp>
+      <p:pic>
+        <p:nvPicPr>
+          <p:cNvPr id="2" name="Imagem 1"/>
+          <p:cNvPicPr>
+            <a:picLocks noChangeAspect="1"/>
+          </p:cNvPicPr>
+          <p:nvPr/>
+        </p:nvPicPr>
+        <p:blipFill>
+          <a:blip r:embed="rId3"/>
+          <a:stretch>
+            <a:fillRect/>
+          </a:stretch>
+        </p:blipFill>
+        <p:spPr>
+          <a:xfrm>
+            <a:off x="414237" y="1463041"/>
+            <a:ext cx="2162477" cy="2247912"/>
+          </a:xfrm>
+          <a:prstGeom prst="rect">
+            <a:avLst/>
+          </a:prstGeom>
+        </p:spPr>
+      </p:pic>
+      <p:pic>
+        <p:nvPicPr>
+          <p:cNvPr id="3" name="Imagem 2"/>
+          <p:cNvPicPr>
+            <a:picLocks noChangeAspect="1"/>
+          </p:cNvPicPr>
+          <p:nvPr/>
+        </p:nvPicPr>
+        <p:blipFill>
+          <a:blip r:embed="rId4"/>
+          <a:stretch>
+            <a:fillRect/>
+          </a:stretch>
+        </p:blipFill>
+        <p:spPr>
+          <a:xfrm>
+            <a:off x="4279585" y="1463592"/>
+            <a:ext cx="2875183" cy="3082834"/>
+          </a:xfrm>
+          <a:prstGeom prst="rect">
+            <a:avLst/>
+          </a:prstGeom>
+        </p:spPr>
+      </p:pic>
+      <p:pic>
+        <p:nvPicPr>
+          <p:cNvPr id="9" name="Imagem 8"/>
+          <p:cNvPicPr>
+            <a:picLocks noChangeAspect="1"/>
+          </p:cNvPicPr>
+          <p:nvPr/>
+        </p:nvPicPr>
+        <p:blipFill>
+          <a:blip r:embed="rId5"/>
+          <a:stretch>
+            <a:fillRect/>
+          </a:stretch>
+        </p:blipFill>
+        <p:spPr>
+          <a:xfrm>
+            <a:off x="8183492" y="1463041"/>
+            <a:ext cx="3610479" cy="1857634"/>
+          </a:xfrm>
+          <a:prstGeom prst="rect">
+            <a:avLst/>
+          </a:prstGeom>
+        </p:spPr>
+      </p:pic>
     </p:spTree>
     <p:extLst>
       <p:ext uri="{BB962C8B-B14F-4D97-AF65-F5344CB8AC3E}">
-        <p14:creationId xmlns:p14="http://schemas.microsoft.com/office/powerpoint/2010/main" val="1087188753"/>
+        <p14:creationId xmlns:p14="http://schemas.microsoft.com/office/powerpoint/2010/main" val="524593019"/>
       </p:ext>
     </p:extLst>
   </p:cSld>
   <p:clrMapOvr>
     <a:masterClrMapping/>
   </p:clrMapOvr>
-  <mc:AlternateContent xmlns:mc="http://schemas.openxmlformats.org/markup-compatibility/2006">
-    <mc:Choice xmlns:p14="http://schemas.microsoft.com/office/powerpoint/2010/main" Requires="p14">
+  <mc:AlternateContent xmlns:mc="http://schemas.openxmlformats.org/markup-compatibility/2006" xmlns:p14="http://schemas.microsoft.com/office/powerpoint/2010/main">
+    <mc:Choice Requires="p14">
       <p:transition spd="slow" p14:dur="1250">
         <p14:switch dir="r"/>
       </p:transition>
     </mc:Choice>
-    <mc:Fallback>
+    <mc:Fallback xmlns="">
       <p:transition spd="slow">
         <p:fade/>
       </p:transition>
@@ -3597,8 +3458,8 @@
         </p:nvSpPr>
         <p:spPr>
           <a:xfrm>
-            <a:off x="2441881" y="0"/>
-            <a:ext cx="7117080" cy="953588"/>
+            <a:off x="825137" y="679270"/>
+            <a:ext cx="10515600" cy="953588"/>
           </a:xfrm>
           <a:prstGeom prst="rect">
             <a:avLst/>
@@ -3639,6 +3500,14 @@
           </a:lstStyle>
           <a:p>
             <a:r>
+              <a:rPr lang="pt-BR" b="1" dirty="0" smtClean="0">
+                <a:solidFill>
+                  <a:srgbClr val="FFFF00"/>
+                </a:solidFill>
+              </a:rPr>
+              <a:t>Service/</a:t>
+            </a:r>
+            <a:r>
               <a:rPr lang="pt-BR" b="1" dirty="0" err="1" smtClean="0">
                 <a:solidFill>
                   <a:srgbClr val="FFFF00"/>
@@ -3652,7 +3521,15 @@
                   <a:srgbClr val="FFFF00"/>
                 </a:solidFill>
               </a:rPr>
-              <a:t> Response </a:t>
+              <a:t> </a:t>
+            </a:r>
+            <a:r>
+              <a:rPr lang="pt-BR" b="1" dirty="0" err="1" smtClean="0">
+                <a:solidFill>
+                  <a:srgbClr val="FFFF00"/>
+                </a:solidFill>
+              </a:rPr>
+              <a:t>Request</a:t>
             </a:r>
             <a:endParaRPr lang="pt-BR" b="1" dirty="0" smtClean="0">
               <a:solidFill>
@@ -3664,7 +3541,7 @@
       </p:sp>
       <p:pic>
         <p:nvPicPr>
-          <p:cNvPr id="9" name="Imagem 8"/>
+          <p:cNvPr id="4" name="Imagem 3"/>
           <p:cNvPicPr>
             <a:picLocks noChangeAspect="1"/>
           </p:cNvPicPr>
@@ -3678,32 +3555,8 @@
         </p:blipFill>
         <p:spPr>
           <a:xfrm>
-            <a:off x="3280969" y="1375024"/>
-            <a:ext cx="5630061" cy="1047896"/>
-          </a:xfrm>
-          <a:prstGeom prst="rect">
-            <a:avLst/>
-          </a:prstGeom>
-        </p:spPr>
-      </p:pic>
-      <p:pic>
-        <p:nvPicPr>
-          <p:cNvPr id="10" name="Imagem 9"/>
-          <p:cNvPicPr>
-            <a:picLocks noChangeAspect="1"/>
-          </p:cNvPicPr>
-          <p:nvPr/>
-        </p:nvPicPr>
-        <p:blipFill>
-          <a:blip r:embed="rId4"/>
-          <a:stretch>
-            <a:fillRect/>
-          </a:stretch>
-        </p:blipFill>
-        <p:spPr>
-          <a:xfrm>
-            <a:off x="2085099" y="3075423"/>
-            <a:ext cx="7830643" cy="2659965"/>
+            <a:off x="4431421" y="1928857"/>
+            <a:ext cx="3057952" cy="2314898"/>
           </a:xfrm>
           <a:prstGeom prst="rect">
             <a:avLst/>
@@ -3713,20 +3566,20 @@
     </p:spTree>
     <p:extLst>
       <p:ext uri="{BB962C8B-B14F-4D97-AF65-F5344CB8AC3E}">
-        <p14:creationId xmlns:p14="http://schemas.microsoft.com/office/powerpoint/2010/main" val="820926130"/>
+        <p14:creationId xmlns:p14="http://schemas.microsoft.com/office/powerpoint/2010/main" val="1369710829"/>
       </p:ext>
     </p:extLst>
   </p:cSld>
   <p:clrMapOvr>
     <a:masterClrMapping/>
   </p:clrMapOvr>
-  <mc:AlternateContent xmlns:mc="http://schemas.openxmlformats.org/markup-compatibility/2006">
-    <mc:Choice xmlns:p14="http://schemas.microsoft.com/office/powerpoint/2010/main" Requires="p14">
+  <mc:AlternateContent xmlns:mc="http://schemas.openxmlformats.org/markup-compatibility/2006" xmlns:p14="http://schemas.microsoft.com/office/powerpoint/2010/main">
+    <mc:Choice Requires="p14">
       <p:transition spd="slow" p14:dur="1250">
         <p14:switch dir="r"/>
       </p:transition>
     </mc:Choice>
-    <mc:Fallback>
+    <mc:Fallback xmlns="">
       <p:transition spd="slow">
         <p:fade/>
       </p:transition>
@@ -3799,8 +3652,8 @@
         </p:nvSpPr>
         <p:spPr>
           <a:xfrm>
-            <a:off x="2441881" y="35594"/>
-            <a:ext cx="7117080" cy="809897"/>
+            <a:off x="2441881" y="0"/>
+            <a:ext cx="7117080" cy="953588"/>
           </a:xfrm>
           <a:prstGeom prst="rect">
             <a:avLst/>
@@ -3818,7 +3671,7 @@
         </p:spPr>
         <p:txBody>
           <a:bodyPr vert="horz" lIns="91440" tIns="45720" rIns="91440" bIns="45720" rtlCol="0" anchor="b">
-            <a:normAutofit fontScale="92500" lnSpcReduction="10000"/>
+            <a:normAutofit fontScale="77500" lnSpcReduction="20000"/>
           </a:bodyPr>
           <a:lstStyle>
             <a:lvl1pPr algn="ctr" defTabSz="914400" rtl="0" eaLnBrk="1" latinLnBrk="0" hangingPunct="1">
@@ -3841,12 +3694,20 @@
           </a:lstStyle>
           <a:p>
             <a:r>
+              <a:rPr lang="pt-BR" b="1" dirty="0" smtClean="0">
+                <a:solidFill>
+                  <a:srgbClr val="FFFF00"/>
+                </a:solidFill>
+              </a:rPr>
+              <a:t>Service </a:t>
+            </a:r>
+            <a:r>
               <a:rPr lang="pt-BR" b="1" dirty="0" err="1" smtClean="0">
                 <a:solidFill>
                   <a:srgbClr val="FFFF00"/>
                 </a:solidFill>
               </a:rPr>
-              <a:t>HanSOLO</a:t>
+              <a:t>Command</a:t>
             </a:r>
             <a:r>
               <a:rPr lang="pt-BR" b="1" dirty="0" smtClean="0">
@@ -3854,13 +3715,8 @@
                   <a:srgbClr val="FFFF00"/>
                 </a:solidFill>
               </a:rPr>
-              <a:t>/ Autenticação</a:t>
-            </a:r>
-            <a:endParaRPr lang="pt-BR" b="1" dirty="0" smtClean="0">
-              <a:solidFill>
-                <a:srgbClr val="FFFF00"/>
-              </a:solidFill>
-            </a:endParaRPr>
+              <a:t> Response </a:t>
+            </a:r>
           </a:p>
         </p:txBody>
       </p:sp>
@@ -3880,17 +3736,41 @@
         </p:blipFill>
         <p:spPr>
           <a:xfrm>
-            <a:off x="7712290" y="1148558"/>
-            <a:ext cx="4239217" cy="2934109"/>
+            <a:off x="6281827" y="1188719"/>
+            <a:ext cx="5383305" cy="2495006"/>
           </a:xfrm>
           <a:prstGeom prst="rect">
             <a:avLst/>
           </a:prstGeom>
         </p:spPr>
       </p:pic>
-      <p:sp>
-        <p:nvSpPr>
-          <p:cNvPr id="8" name="Título 1"/>
+      <p:pic>
+        <p:nvPicPr>
+          <p:cNvPr id="3" name="Imagem 2"/>
+          <p:cNvPicPr>
+            <a:picLocks noChangeAspect="1"/>
+          </p:cNvPicPr>
+          <p:nvPr/>
+        </p:nvPicPr>
+        <p:blipFill>
+          <a:blip r:embed="rId4"/>
+          <a:stretch>
+            <a:fillRect/>
+          </a:stretch>
+        </p:blipFill>
+        <p:spPr>
+          <a:xfrm>
+            <a:off x="196304" y="1188719"/>
+            <a:ext cx="5889219" cy="5277587"/>
+          </a:xfrm>
+          <a:prstGeom prst="rect">
+            <a:avLst/>
+          </a:prstGeom>
+        </p:spPr>
+      </p:pic>
+      <p:sp>
+        <p:nvSpPr>
+          <p:cNvPr id="6" name="Título 1"/>
           <p:cNvSpPr txBox="1">
             <a:spLocks/>
           </p:cNvSpPr>
@@ -3898,7 +3778,7 @@
         </p:nvSpPr>
         <p:spPr>
           <a:xfrm>
-            <a:off x="2291998" y="499325"/>
+            <a:off x="855083" y="542425"/>
             <a:ext cx="2589053" cy="692331"/>
           </a:xfrm>
           <a:prstGeom prst="rect">
@@ -3945,27 +3825,14 @@
                   <a:srgbClr val="FFFF00"/>
                 </a:solidFill>
               </a:rPr>
-              <a:t>Antes</a:t>
-            </a:r>
-            <a:r>
-              <a:rPr lang="pt-BR" sz="2800" b="1" dirty="0" smtClean="0">
-                <a:solidFill>
-                  <a:srgbClr val="FFFF00"/>
-                </a:solidFill>
-              </a:rPr>
-              <a:t> </a:t>
-            </a:r>
-            <a:endParaRPr lang="pt-BR" sz="2800" b="1" dirty="0" smtClean="0">
-              <a:solidFill>
-                <a:srgbClr val="FFFF00"/>
-              </a:solidFill>
-            </a:endParaRPr>
-          </a:p>
-        </p:txBody>
-      </p:sp>
-      <p:sp>
-        <p:nvSpPr>
-          <p:cNvPr id="10" name="Título 1"/>
+              <a:t>Antes </a:t>
+            </a:r>
+          </a:p>
+        </p:txBody>
+      </p:sp>
+      <p:sp>
+        <p:nvSpPr>
+          <p:cNvPr id="8" name="Título 1"/>
           <p:cNvSpPr txBox="1">
             <a:spLocks/>
           </p:cNvSpPr>
@@ -3973,7 +3840,7 @@
         </p:nvSpPr>
         <p:spPr>
           <a:xfrm>
-            <a:off x="8556706" y="489200"/>
+            <a:off x="8264435" y="542426"/>
             <a:ext cx="2589053" cy="692331"/>
           </a:xfrm>
           <a:prstGeom prst="rect">
@@ -4022,55 +3889,26 @@
               </a:rPr>
               <a:t>Depois </a:t>
             </a:r>
-            <a:endParaRPr lang="pt-BR" sz="2800" b="1" dirty="0" smtClean="0">
-              <a:solidFill>
-                <a:srgbClr val="FFFF00"/>
-              </a:solidFill>
-            </a:endParaRPr>
-          </a:p>
-        </p:txBody>
-      </p:sp>
-      <p:pic>
-        <p:nvPicPr>
-          <p:cNvPr id="3" name="Imagem 2"/>
-          <p:cNvPicPr>
-            <a:picLocks noChangeAspect="1"/>
-          </p:cNvPicPr>
-          <p:nvPr/>
-        </p:nvPicPr>
-        <p:blipFill>
-          <a:blip r:embed="rId4"/>
-          <a:stretch>
-            <a:fillRect/>
-          </a:stretch>
-        </p:blipFill>
-        <p:spPr>
-          <a:xfrm>
-            <a:off x="162596" y="1148558"/>
-            <a:ext cx="7191793" cy="5578813"/>
-          </a:xfrm>
-          <a:prstGeom prst="rect">
-            <a:avLst/>
-          </a:prstGeom>
-        </p:spPr>
-      </p:pic>
+          </a:p>
+        </p:txBody>
+      </p:sp>
     </p:spTree>
     <p:extLst>
       <p:ext uri="{BB962C8B-B14F-4D97-AF65-F5344CB8AC3E}">
-        <p14:creationId xmlns:p14="http://schemas.microsoft.com/office/powerpoint/2010/main" val="3410184854"/>
+        <p14:creationId xmlns:p14="http://schemas.microsoft.com/office/powerpoint/2010/main" val="1087188753"/>
       </p:ext>
     </p:extLst>
   </p:cSld>
   <p:clrMapOvr>
     <a:masterClrMapping/>
   </p:clrMapOvr>
-  <mc:AlternateContent xmlns:mc="http://schemas.openxmlformats.org/markup-compatibility/2006">
-    <mc:Choice xmlns:p14="http://schemas.microsoft.com/office/powerpoint/2010/main" Requires="p14">
+  <mc:AlternateContent xmlns:mc="http://schemas.openxmlformats.org/markup-compatibility/2006" xmlns:p14="http://schemas.microsoft.com/office/powerpoint/2010/main">
+    <mc:Choice Requires="p14">
       <p:transition spd="slow" p14:dur="1250">
         <p14:switch dir="r"/>
       </p:transition>
     </mc:Choice>
-    <mc:Fallback>
+    <mc:Fallback xmlns="">
       <p:transition spd="slow">
         <p:fade/>
       </p:transition>
@@ -4143,8 +3981,8 @@
         </p:nvSpPr>
         <p:spPr>
           <a:xfrm>
-            <a:off x="2441881" y="35594"/>
-            <a:ext cx="7117080" cy="809897"/>
+            <a:off x="2441881" y="0"/>
+            <a:ext cx="7117080" cy="953588"/>
           </a:xfrm>
           <a:prstGeom prst="rect">
             <a:avLst/>
@@ -4162,7 +4000,7 @@
         </p:spPr>
         <p:txBody>
           <a:bodyPr vert="horz" lIns="91440" tIns="45720" rIns="91440" bIns="45720" rtlCol="0" anchor="b">
-            <a:normAutofit fontScale="92500" lnSpcReduction="10000"/>
+            <a:normAutofit/>
           </a:bodyPr>
           <a:lstStyle>
             <a:lvl1pPr algn="ctr" defTabSz="914400" rtl="0" eaLnBrk="1" latinLnBrk="0" hangingPunct="1">
@@ -4190,7 +4028,7 @@
                   <a:srgbClr val="FFFF00"/>
                 </a:solidFill>
               </a:rPr>
-              <a:t>HanSOLO</a:t>
+              <a:t>Command</a:t>
             </a:r>
             <a:r>
               <a:rPr lang="pt-BR" b="1" dirty="0" smtClean="0">
@@ -4198,19 +4036,14 @@
                   <a:srgbClr val="FFFF00"/>
                 </a:solidFill>
               </a:rPr>
-              <a:t>/ Autenticação</a:t>
-            </a:r>
-            <a:endParaRPr lang="pt-BR" b="1" dirty="0" smtClean="0">
-              <a:solidFill>
-                <a:srgbClr val="FFFF00"/>
-              </a:solidFill>
-            </a:endParaRPr>
+              <a:t> Response </a:t>
+            </a:r>
           </a:p>
         </p:txBody>
       </p:sp>
       <p:pic>
         <p:nvPicPr>
-          <p:cNvPr id="4" name="Imagem 3"/>
+          <p:cNvPr id="9" name="Imagem 8"/>
           <p:cNvPicPr>
             <a:picLocks noChangeAspect="1"/>
           </p:cNvPicPr>
@@ -4224,8 +4057,8 @@
         </p:blipFill>
         <p:spPr>
           <a:xfrm>
-            <a:off x="727142" y="1091367"/>
-            <a:ext cx="1714739" cy="695422"/>
+            <a:off x="3280969" y="1375024"/>
+            <a:ext cx="5630061" cy="1047896"/>
           </a:xfrm>
           <a:prstGeom prst="rect">
             <a:avLst/>
@@ -4234,7 +4067,7 @@
       </p:pic>
       <p:pic>
         <p:nvPicPr>
-          <p:cNvPr id="9" name="Imagem 8"/>
+          <p:cNvPr id="10" name="Imagem 9"/>
           <p:cNvPicPr>
             <a:picLocks noChangeAspect="1"/>
           </p:cNvPicPr>
@@ -4248,56 +4081,8 @@
         </p:blipFill>
         <p:spPr>
           <a:xfrm>
-            <a:off x="750311" y="1993477"/>
-            <a:ext cx="2162477" cy="1771897"/>
-          </a:xfrm>
-          <a:prstGeom prst="rect">
-            <a:avLst/>
-          </a:prstGeom>
-        </p:spPr>
-      </p:pic>
-      <p:pic>
-        <p:nvPicPr>
-          <p:cNvPr id="11" name="Imagem 10"/>
-          <p:cNvPicPr>
-            <a:picLocks noChangeAspect="1"/>
-          </p:cNvPicPr>
-          <p:nvPr/>
-        </p:nvPicPr>
-        <p:blipFill>
-          <a:blip r:embed="rId5"/>
-          <a:stretch>
-            <a:fillRect/>
-          </a:stretch>
-        </p:blipFill>
-        <p:spPr>
-          <a:xfrm>
-            <a:off x="750311" y="3929871"/>
-            <a:ext cx="5649113" cy="2838846"/>
-          </a:xfrm>
-          <a:prstGeom prst="rect">
-            <a:avLst/>
-          </a:prstGeom>
-        </p:spPr>
-      </p:pic>
-      <p:pic>
-        <p:nvPicPr>
-          <p:cNvPr id="15" name="Imagem 14"/>
-          <p:cNvPicPr>
-            <a:picLocks noChangeAspect="1"/>
-          </p:cNvPicPr>
-          <p:nvPr/>
-        </p:nvPicPr>
-        <p:blipFill>
-          <a:blip r:embed="rId6"/>
-          <a:stretch>
-            <a:fillRect/>
-          </a:stretch>
-        </p:blipFill>
-        <p:spPr>
-          <a:xfrm>
-            <a:off x="6752182" y="1091367"/>
-            <a:ext cx="5087060" cy="5087060"/>
+            <a:off x="2085099" y="3075423"/>
+            <a:ext cx="7830643" cy="2659965"/>
           </a:xfrm>
           <a:prstGeom prst="rect">
             <a:avLst/>
@@ -4307,20 +4092,20 @@
     </p:spTree>
     <p:extLst>
       <p:ext uri="{BB962C8B-B14F-4D97-AF65-F5344CB8AC3E}">
-        <p14:creationId xmlns:p14="http://schemas.microsoft.com/office/powerpoint/2010/main" val="2152821143"/>
+        <p14:creationId xmlns:p14="http://schemas.microsoft.com/office/powerpoint/2010/main" val="820926130"/>
       </p:ext>
     </p:extLst>
   </p:cSld>
   <p:clrMapOvr>
     <a:masterClrMapping/>
   </p:clrMapOvr>
-  <mc:AlternateContent xmlns:mc="http://schemas.openxmlformats.org/markup-compatibility/2006">
-    <mc:Choice xmlns:p14="http://schemas.microsoft.com/office/powerpoint/2010/main" Requires="p14">
+  <mc:AlternateContent xmlns:mc="http://schemas.openxmlformats.org/markup-compatibility/2006" xmlns:p14="http://schemas.microsoft.com/office/powerpoint/2010/main">
+    <mc:Choice Requires="p14">
       <p:transition spd="slow" p14:dur="1250">
         <p14:switch dir="r"/>
       </p:transition>
     </mc:Choice>
-    <mc:Fallback>
+    <mc:Fallback xmlns="">
       <p:transition spd="slow">
         <p:fade/>
       </p:transition>
@@ -4383,57 +4168,9 @@
           </a:prstGeom>
         </p:spPr>
       </p:pic>
-      <p:pic>
-        <p:nvPicPr>
-          <p:cNvPr id="2" name="Imagem 1"/>
-          <p:cNvPicPr>
-            <a:picLocks noChangeAspect="1"/>
-          </p:cNvPicPr>
-          <p:nvPr/>
-        </p:nvPicPr>
-        <p:blipFill>
-          <a:blip r:embed="rId3"/>
-          <a:stretch>
-            <a:fillRect/>
-          </a:stretch>
-        </p:blipFill>
-        <p:spPr>
-          <a:xfrm>
-            <a:off x="487238" y="1048931"/>
-            <a:ext cx="4372585" cy="4525006"/>
-          </a:xfrm>
-          <a:prstGeom prst="rect">
-            <a:avLst/>
-          </a:prstGeom>
-        </p:spPr>
-      </p:pic>
-      <p:pic>
-        <p:nvPicPr>
-          <p:cNvPr id="3" name="Imagem 2"/>
-          <p:cNvPicPr>
-            <a:picLocks noChangeAspect="1"/>
-          </p:cNvPicPr>
-          <p:nvPr/>
-        </p:nvPicPr>
-        <p:blipFill>
-          <a:blip r:embed="rId4"/>
-          <a:stretch>
-            <a:fillRect/>
-          </a:stretch>
-        </p:blipFill>
-        <p:spPr>
-          <a:xfrm>
-            <a:off x="5434617" y="1110852"/>
-            <a:ext cx="6182588" cy="2200582"/>
-          </a:xfrm>
-          <a:prstGeom prst="rect">
-            <a:avLst/>
-          </a:prstGeom>
-        </p:spPr>
-      </p:pic>
-      <p:sp>
-        <p:nvSpPr>
-          <p:cNvPr id="6" name="Título 1"/>
+      <p:sp>
+        <p:nvSpPr>
+          <p:cNvPr id="5" name="Título 1"/>
           <p:cNvSpPr txBox="1">
             <a:spLocks/>
           </p:cNvSpPr>
@@ -4441,7 +4178,7 @@
         </p:nvSpPr>
         <p:spPr>
           <a:xfrm>
-            <a:off x="2537460" y="150478"/>
+            <a:off x="2441881" y="35594"/>
             <a:ext cx="7117080" cy="809897"/>
           </a:xfrm>
           <a:prstGeom prst="rect">
@@ -4488,7 +4225,7 @@
                   <a:srgbClr val="FFFF00"/>
                 </a:solidFill>
               </a:rPr>
-              <a:t>Azure</a:t>
+              <a:t>HanSOLO</a:t>
             </a:r>
             <a:r>
               <a:rPr lang="pt-BR" b="1" dirty="0" smtClean="0">
@@ -4496,41 +4233,200 @@
                   <a:srgbClr val="FFFF00"/>
                 </a:solidFill>
               </a:rPr>
-              <a:t> </a:t>
-            </a:r>
-            <a:r>
-              <a:rPr lang="pt-BR" b="1" dirty="0" err="1" smtClean="0">
+              <a:t>/ Autenticação</a:t>
+            </a:r>
+          </a:p>
+        </p:txBody>
+      </p:sp>
+      <p:pic>
+        <p:nvPicPr>
+          <p:cNvPr id="2" name="Imagem 1"/>
+          <p:cNvPicPr>
+            <a:picLocks noChangeAspect="1"/>
+          </p:cNvPicPr>
+          <p:nvPr/>
+        </p:nvPicPr>
+        <p:blipFill>
+          <a:blip r:embed="rId3"/>
+          <a:stretch>
+            <a:fillRect/>
+          </a:stretch>
+        </p:blipFill>
+        <p:spPr>
+          <a:xfrm>
+            <a:off x="7712290" y="1148558"/>
+            <a:ext cx="4239217" cy="2934109"/>
+          </a:xfrm>
+          <a:prstGeom prst="rect">
+            <a:avLst/>
+          </a:prstGeom>
+        </p:spPr>
+      </p:pic>
+      <p:sp>
+        <p:nvSpPr>
+          <p:cNvPr id="8" name="Título 1"/>
+          <p:cNvSpPr txBox="1">
+            <a:spLocks/>
+          </p:cNvSpPr>
+          <p:nvPr/>
+        </p:nvSpPr>
+        <p:spPr>
+          <a:xfrm>
+            <a:off x="2291998" y="499325"/>
+            <a:ext cx="2589053" cy="692331"/>
+          </a:xfrm>
+          <a:prstGeom prst="rect">
+            <a:avLst/>
+          </a:prstGeom>
+          <a:effectLst>
+            <a:reflection endPos="0" dir="5400000" sy="-100000" algn="bl" rotWithShape="0"/>
+          </a:effectLst>
+          <a:scene3d>
+            <a:camera prst="orthographicFront"/>
+            <a:lightRig rig="threePt" dir="t"/>
+          </a:scene3d>
+          <a:sp3d prstMaterial="dkEdge">
+            <a:bevelB w="0"/>
+          </a:sp3d>
+        </p:spPr>
+        <p:txBody>
+          <a:bodyPr vert="horz" lIns="91440" tIns="45720" rIns="91440" bIns="45720" rtlCol="0" anchor="b">
+            <a:normAutofit/>
+          </a:bodyPr>
+          <a:lstStyle>
+            <a:lvl1pPr algn="ctr" defTabSz="914400" rtl="0" eaLnBrk="1" latinLnBrk="0" hangingPunct="1">
+              <a:lnSpc>
+                <a:spcPct val="90000"/>
+              </a:lnSpc>
+              <a:spcBef>
+                <a:spcPct val="0"/>
+              </a:spcBef>
+              <a:buNone/>
+              <a:defRPr sz="6000" kern="1200">
+                <a:solidFill>
+                  <a:schemeClr val="tx1"/>
+                </a:solidFill>
+                <a:latin typeface="+mj-lt"/>
+                <a:ea typeface="+mj-ea"/>
+                <a:cs typeface="+mj-cs"/>
+              </a:defRPr>
+            </a:lvl1pPr>
+          </a:lstStyle>
+          <a:p>
+            <a:r>
+              <a:rPr lang="pt-BR" sz="2800" b="1" dirty="0" smtClean="0">
                 <a:solidFill>
                   <a:srgbClr val="FFFF00"/>
                 </a:solidFill>
               </a:rPr>
-              <a:t>Function</a:t>
-            </a:r>
-            <a:endParaRPr lang="pt-BR" b="1" dirty="0" smtClean="0">
-              <a:solidFill>
-                <a:srgbClr val="FFFF00"/>
-              </a:solidFill>
-            </a:endParaRPr>
-          </a:p>
-        </p:txBody>
-      </p:sp>
+              <a:t>Antes </a:t>
+            </a:r>
+          </a:p>
+        </p:txBody>
+      </p:sp>
+      <p:sp>
+        <p:nvSpPr>
+          <p:cNvPr id="10" name="Título 1"/>
+          <p:cNvSpPr txBox="1">
+            <a:spLocks/>
+          </p:cNvSpPr>
+          <p:nvPr/>
+        </p:nvSpPr>
+        <p:spPr>
+          <a:xfrm>
+            <a:off x="8556706" y="489200"/>
+            <a:ext cx="2589053" cy="692331"/>
+          </a:xfrm>
+          <a:prstGeom prst="rect">
+            <a:avLst/>
+          </a:prstGeom>
+          <a:effectLst>
+            <a:reflection endPos="0" dir="5400000" sy="-100000" algn="bl" rotWithShape="0"/>
+          </a:effectLst>
+          <a:scene3d>
+            <a:camera prst="orthographicFront"/>
+            <a:lightRig rig="threePt" dir="t"/>
+          </a:scene3d>
+          <a:sp3d prstMaterial="dkEdge">
+            <a:bevelB w="0"/>
+          </a:sp3d>
+        </p:spPr>
+        <p:txBody>
+          <a:bodyPr vert="horz" lIns="91440" tIns="45720" rIns="91440" bIns="45720" rtlCol="0" anchor="b">
+            <a:normAutofit/>
+          </a:bodyPr>
+          <a:lstStyle>
+            <a:lvl1pPr algn="ctr" defTabSz="914400" rtl="0" eaLnBrk="1" latinLnBrk="0" hangingPunct="1">
+              <a:lnSpc>
+                <a:spcPct val="90000"/>
+              </a:lnSpc>
+              <a:spcBef>
+                <a:spcPct val="0"/>
+              </a:spcBef>
+              <a:buNone/>
+              <a:defRPr sz="6000" kern="1200">
+                <a:solidFill>
+                  <a:schemeClr val="tx1"/>
+                </a:solidFill>
+                <a:latin typeface="+mj-lt"/>
+                <a:ea typeface="+mj-ea"/>
+                <a:cs typeface="+mj-cs"/>
+              </a:defRPr>
+            </a:lvl1pPr>
+          </a:lstStyle>
+          <a:p>
+            <a:r>
+              <a:rPr lang="pt-BR" sz="2800" b="1" dirty="0" smtClean="0">
+                <a:solidFill>
+                  <a:srgbClr val="FFFF00"/>
+                </a:solidFill>
+              </a:rPr>
+              <a:t>Depois </a:t>
+            </a:r>
+          </a:p>
+        </p:txBody>
+      </p:sp>
+      <p:pic>
+        <p:nvPicPr>
+          <p:cNvPr id="3" name="Imagem 2"/>
+          <p:cNvPicPr>
+            <a:picLocks noChangeAspect="1"/>
+          </p:cNvPicPr>
+          <p:nvPr/>
+        </p:nvPicPr>
+        <p:blipFill>
+          <a:blip r:embed="rId4"/>
+          <a:stretch>
+            <a:fillRect/>
+          </a:stretch>
+        </p:blipFill>
+        <p:spPr>
+          <a:xfrm>
+            <a:off x="162596" y="1148558"/>
+            <a:ext cx="7191793" cy="5578813"/>
+          </a:xfrm>
+          <a:prstGeom prst="rect">
+            <a:avLst/>
+          </a:prstGeom>
+        </p:spPr>
+      </p:pic>
     </p:spTree>
     <p:extLst>
       <p:ext uri="{BB962C8B-B14F-4D97-AF65-F5344CB8AC3E}">
-        <p14:creationId xmlns:p14="http://schemas.microsoft.com/office/powerpoint/2010/main" val="2800839755"/>
+        <p14:creationId xmlns:p14="http://schemas.microsoft.com/office/powerpoint/2010/main" val="3410184854"/>
       </p:ext>
     </p:extLst>
   </p:cSld>
   <p:clrMapOvr>
     <a:masterClrMapping/>
   </p:clrMapOvr>
-  <mc:AlternateContent xmlns:mc="http://schemas.openxmlformats.org/markup-compatibility/2006">
-    <mc:Choice xmlns:p14="http://schemas.microsoft.com/office/powerpoint/2010/main" Requires="p14">
+  <mc:AlternateContent xmlns:mc="http://schemas.openxmlformats.org/markup-compatibility/2006" xmlns:p14="http://schemas.microsoft.com/office/powerpoint/2010/main">
+    <mc:Choice Requires="p14">
       <p:transition spd="slow" p14:dur="1250">
         <p14:switch dir="r"/>
       </p:transition>
     </mc:Choice>
-    <mc:Fallback>
+    <mc:Fallback xmlns="">
       <p:transition spd="slow">
         <p:fade/>
       </p:transition>
@@ -4585,32 +4481,8 @@
         </p:blipFill>
         <p:spPr>
           <a:xfrm>
-            <a:off x="0" y="3348"/>
+            <a:off x="0" y="0"/>
             <a:ext cx="12192000" cy="6854652"/>
-          </a:xfrm>
-          <a:prstGeom prst="rect">
-            <a:avLst/>
-          </a:prstGeom>
-        </p:spPr>
-      </p:pic>
-      <p:pic>
-        <p:nvPicPr>
-          <p:cNvPr id="2" name="Imagem 1"/>
-          <p:cNvPicPr>
-            <a:picLocks noChangeAspect="1"/>
-          </p:cNvPicPr>
-          <p:nvPr/>
-        </p:nvPicPr>
-        <p:blipFill>
-          <a:blip r:embed="rId3"/>
-          <a:stretch>
-            <a:fillRect/>
-          </a:stretch>
-        </p:blipFill>
-        <p:spPr>
-          <a:xfrm>
-            <a:off x="1489166" y="979712"/>
-            <a:ext cx="8752114" cy="4611189"/>
           </a:xfrm>
           <a:prstGeom prst="rect">
             <a:avLst/>
@@ -4627,7 +4499,7 @@
         </p:nvSpPr>
         <p:spPr>
           <a:xfrm>
-            <a:off x="2694214" y="169815"/>
+            <a:off x="2441881" y="35594"/>
             <a:ext cx="7117080" cy="809897"/>
           </a:xfrm>
           <a:prstGeom prst="rect">
@@ -4669,38 +4541,137 @@
           </a:lstStyle>
           <a:p>
             <a:r>
+              <a:rPr lang="pt-BR" b="1" dirty="0" err="1" smtClean="0">
+                <a:solidFill>
+                  <a:srgbClr val="FFFF00"/>
+                </a:solidFill>
+              </a:rPr>
+              <a:t>HanSOLO</a:t>
+            </a:r>
+            <a:r>
               <a:rPr lang="pt-BR" b="1" dirty="0" smtClean="0">
                 <a:solidFill>
                   <a:srgbClr val="FFFF00"/>
                 </a:solidFill>
               </a:rPr>
-              <a:t>Antes</a:t>
-            </a:r>
-            <a:endParaRPr lang="pt-BR" b="1" dirty="0" smtClean="0">
-              <a:solidFill>
-                <a:srgbClr val="FFFF00"/>
-              </a:solidFill>
-            </a:endParaRPr>
-          </a:p>
-        </p:txBody>
-      </p:sp>
+              <a:t>/ Autenticação</a:t>
+            </a:r>
+          </a:p>
+        </p:txBody>
+      </p:sp>
+      <p:pic>
+        <p:nvPicPr>
+          <p:cNvPr id="4" name="Imagem 3"/>
+          <p:cNvPicPr>
+            <a:picLocks noChangeAspect="1"/>
+          </p:cNvPicPr>
+          <p:nvPr/>
+        </p:nvPicPr>
+        <p:blipFill>
+          <a:blip r:embed="rId3"/>
+          <a:stretch>
+            <a:fillRect/>
+          </a:stretch>
+        </p:blipFill>
+        <p:spPr>
+          <a:xfrm>
+            <a:off x="727142" y="1091367"/>
+            <a:ext cx="1714739" cy="695422"/>
+          </a:xfrm>
+          <a:prstGeom prst="rect">
+            <a:avLst/>
+          </a:prstGeom>
+        </p:spPr>
+      </p:pic>
+      <p:pic>
+        <p:nvPicPr>
+          <p:cNvPr id="9" name="Imagem 8"/>
+          <p:cNvPicPr>
+            <a:picLocks noChangeAspect="1"/>
+          </p:cNvPicPr>
+          <p:nvPr/>
+        </p:nvPicPr>
+        <p:blipFill>
+          <a:blip r:embed="rId4"/>
+          <a:stretch>
+            <a:fillRect/>
+          </a:stretch>
+        </p:blipFill>
+        <p:spPr>
+          <a:xfrm>
+            <a:off x="750311" y="1993477"/>
+            <a:ext cx="2162477" cy="1771897"/>
+          </a:xfrm>
+          <a:prstGeom prst="rect">
+            <a:avLst/>
+          </a:prstGeom>
+        </p:spPr>
+      </p:pic>
+      <p:pic>
+        <p:nvPicPr>
+          <p:cNvPr id="11" name="Imagem 10"/>
+          <p:cNvPicPr>
+            <a:picLocks noChangeAspect="1"/>
+          </p:cNvPicPr>
+          <p:nvPr/>
+        </p:nvPicPr>
+        <p:blipFill>
+          <a:blip r:embed="rId5"/>
+          <a:stretch>
+            <a:fillRect/>
+          </a:stretch>
+        </p:blipFill>
+        <p:spPr>
+          <a:xfrm>
+            <a:off x="750311" y="3929871"/>
+            <a:ext cx="5649113" cy="2838846"/>
+          </a:xfrm>
+          <a:prstGeom prst="rect">
+            <a:avLst/>
+          </a:prstGeom>
+        </p:spPr>
+      </p:pic>
+      <p:pic>
+        <p:nvPicPr>
+          <p:cNvPr id="15" name="Imagem 14"/>
+          <p:cNvPicPr>
+            <a:picLocks noChangeAspect="1"/>
+          </p:cNvPicPr>
+          <p:nvPr/>
+        </p:nvPicPr>
+        <p:blipFill>
+          <a:blip r:embed="rId6"/>
+          <a:stretch>
+            <a:fillRect/>
+          </a:stretch>
+        </p:blipFill>
+        <p:spPr>
+          <a:xfrm>
+            <a:off x="6752182" y="1091367"/>
+            <a:ext cx="5087060" cy="5087060"/>
+          </a:xfrm>
+          <a:prstGeom prst="rect">
+            <a:avLst/>
+          </a:prstGeom>
+        </p:spPr>
+      </p:pic>
     </p:spTree>
     <p:extLst>
       <p:ext uri="{BB962C8B-B14F-4D97-AF65-F5344CB8AC3E}">
-        <p14:creationId xmlns:p14="http://schemas.microsoft.com/office/powerpoint/2010/main" val="1585122224"/>
+        <p14:creationId xmlns:p14="http://schemas.microsoft.com/office/powerpoint/2010/main" val="2152821143"/>
       </p:ext>
     </p:extLst>
   </p:cSld>
   <p:clrMapOvr>
     <a:masterClrMapping/>
   </p:clrMapOvr>
-  <mc:AlternateContent xmlns:mc="http://schemas.openxmlformats.org/markup-compatibility/2006">
-    <mc:Choice xmlns:p14="http://schemas.microsoft.com/office/powerpoint/2010/main" Requires="p14">
+  <mc:AlternateContent xmlns:mc="http://schemas.openxmlformats.org/markup-compatibility/2006" xmlns:p14="http://schemas.microsoft.com/office/powerpoint/2010/main">
+    <mc:Choice Requires="p14">
       <p:transition spd="slow" p14:dur="1250">
         <p14:switch dir="r"/>
       </p:transition>
     </mc:Choice>
-    <mc:Fallback>
+    <mc:Fallback xmlns="">
       <p:transition spd="slow">
         <p:fade/>
       </p:transition>
@@ -4765,7 +4736,7 @@
       </p:pic>
       <p:pic>
         <p:nvPicPr>
-          <p:cNvPr id="10" name="Imagem 9"/>
+          <p:cNvPr id="2" name="Imagem 1"/>
           <p:cNvPicPr>
             <a:picLocks noChangeAspect="1"/>
           </p:cNvPicPr>
@@ -4779,17 +4750,41 @@
         </p:blipFill>
         <p:spPr>
           <a:xfrm>
-            <a:off x="1410787" y="916171"/>
-            <a:ext cx="8974183" cy="5232220"/>
+            <a:off x="487238" y="1048931"/>
+            <a:ext cx="4372585" cy="4525006"/>
           </a:xfrm>
           <a:prstGeom prst="rect">
             <a:avLst/>
           </a:prstGeom>
         </p:spPr>
       </p:pic>
-      <p:sp>
-        <p:nvSpPr>
-          <p:cNvPr id="14" name="Título 1"/>
+      <p:pic>
+        <p:nvPicPr>
+          <p:cNvPr id="3" name="Imagem 2"/>
+          <p:cNvPicPr>
+            <a:picLocks noChangeAspect="1"/>
+          </p:cNvPicPr>
+          <p:nvPr/>
+        </p:nvPicPr>
+        <p:blipFill>
+          <a:blip r:embed="rId4"/>
+          <a:stretch>
+            <a:fillRect/>
+          </a:stretch>
+        </p:blipFill>
+        <p:spPr>
+          <a:xfrm>
+            <a:off x="5434617" y="1110852"/>
+            <a:ext cx="6182588" cy="2200582"/>
+          </a:xfrm>
+          <a:prstGeom prst="rect">
+            <a:avLst/>
+          </a:prstGeom>
+        </p:spPr>
+      </p:pic>
+      <p:sp>
+        <p:nvSpPr>
+          <p:cNvPr id="6" name="Título 1"/>
           <p:cNvSpPr txBox="1">
             <a:spLocks/>
           </p:cNvSpPr>
@@ -4797,7 +4792,7 @@
         </p:nvSpPr>
         <p:spPr>
           <a:xfrm>
-            <a:off x="2694214" y="169815"/>
+            <a:off x="2537460" y="150478"/>
             <a:ext cx="7117080" cy="809897"/>
           </a:xfrm>
           <a:prstGeom prst="rect">
@@ -4839,12 +4834,28 @@
           </a:lstStyle>
           <a:p>
             <a:r>
+              <a:rPr lang="pt-BR" b="1" dirty="0" err="1" smtClean="0">
+                <a:solidFill>
+                  <a:srgbClr val="FFFF00"/>
+                </a:solidFill>
+              </a:rPr>
+              <a:t>Azure</a:t>
+            </a:r>
+            <a:r>
               <a:rPr lang="pt-BR" b="1" dirty="0" smtClean="0">
                 <a:solidFill>
                   <a:srgbClr val="FFFF00"/>
                 </a:solidFill>
               </a:rPr>
-              <a:t>Depois</a:t>
+              <a:t> </a:t>
+            </a:r>
+            <a:r>
+              <a:rPr lang="pt-BR" b="1" dirty="0" err="1" smtClean="0">
+                <a:solidFill>
+                  <a:srgbClr val="FFFF00"/>
+                </a:solidFill>
+              </a:rPr>
+              <a:t>Function</a:t>
             </a:r>
             <a:endParaRPr lang="pt-BR" b="1" dirty="0" smtClean="0">
               <a:solidFill>
@@ -4857,20 +4868,20 @@
     </p:spTree>
     <p:extLst>
       <p:ext uri="{BB962C8B-B14F-4D97-AF65-F5344CB8AC3E}">
-        <p14:creationId xmlns:p14="http://schemas.microsoft.com/office/powerpoint/2010/main" val="2155782042"/>
+        <p14:creationId xmlns:p14="http://schemas.microsoft.com/office/powerpoint/2010/main" val="2800839755"/>
       </p:ext>
     </p:extLst>
   </p:cSld>
   <p:clrMapOvr>
     <a:masterClrMapping/>
   </p:clrMapOvr>
-  <mc:AlternateContent xmlns:mc="http://schemas.openxmlformats.org/markup-compatibility/2006">
-    <mc:Choice xmlns:p14="http://schemas.microsoft.com/office/powerpoint/2010/main" Requires="p14">
+  <mc:AlternateContent xmlns:mc="http://schemas.openxmlformats.org/markup-compatibility/2006" xmlns:p14="http://schemas.microsoft.com/office/powerpoint/2010/main">
+    <mc:Choice Requires="p14">
       <p:transition spd="slow" p14:dur="1250">
         <p14:switch dir="r"/>
       </p:transition>
     </mc:Choice>
-    <mc:Fallback>
+    <mc:Fallback xmlns="">
       <p:transition spd="slow">
         <p:fade/>
       </p:transition>
@@ -4949,8 +4960,8 @@
         </p:blipFill>
         <p:spPr>
           <a:xfrm>
-            <a:off x="4428308" y="2207623"/>
-            <a:ext cx="3136769" cy="1911096"/>
+            <a:off x="4153988" y="2050868"/>
+            <a:ext cx="3659283" cy="2116183"/>
           </a:xfrm>
           <a:prstGeom prst="rect">
             <a:avLst/>
@@ -4967,13 +4978,13 @@
   <p:clrMapOvr>
     <a:masterClrMapping/>
   </p:clrMapOvr>
-  <mc:AlternateContent xmlns:mc="http://schemas.openxmlformats.org/markup-compatibility/2006">
-    <mc:Choice xmlns:p14="http://schemas.microsoft.com/office/powerpoint/2010/main" Requires="p14">
+  <mc:AlternateContent xmlns:mc="http://schemas.openxmlformats.org/markup-compatibility/2006" xmlns:p14="http://schemas.microsoft.com/office/powerpoint/2010/main">
+    <mc:Choice Requires="p14">
       <p:transition spd="slow" p14:dur="800">
         <p14:flythrough/>
       </p:transition>
     </mc:Choice>
-    <mc:Fallback>
+    <mc:Fallback xmlns="">
       <p:transition spd="slow">
         <p:fade/>
       </p:transition>
@@ -5028,7 +5039,7 @@
         </p:blipFill>
         <p:spPr>
           <a:xfrm>
-            <a:off x="0" y="0"/>
+            <a:off x="0" y="3348"/>
             <a:ext cx="12192000" cy="6854652"/>
           </a:xfrm>
           <a:prstGeom prst="rect">
@@ -5036,9 +5047,33 @@
           </a:prstGeom>
         </p:spPr>
       </p:pic>
-      <p:sp>
-        <p:nvSpPr>
-          <p:cNvPr id="6" name="Título 1"/>
+      <p:pic>
+        <p:nvPicPr>
+          <p:cNvPr id="2" name="Imagem 1"/>
+          <p:cNvPicPr>
+            <a:picLocks noChangeAspect="1"/>
+          </p:cNvPicPr>
+          <p:nvPr/>
+        </p:nvPicPr>
+        <p:blipFill>
+          <a:blip r:embed="rId3"/>
+          <a:stretch>
+            <a:fillRect/>
+          </a:stretch>
+        </p:blipFill>
+        <p:spPr>
+          <a:xfrm>
+            <a:off x="1489166" y="979712"/>
+            <a:ext cx="8752114" cy="4611189"/>
+          </a:xfrm>
+          <a:prstGeom prst="rect">
+            <a:avLst/>
+          </a:prstGeom>
+        </p:spPr>
+      </p:pic>
+      <p:sp>
+        <p:nvSpPr>
+          <p:cNvPr id="5" name="Título 1"/>
           <p:cNvSpPr txBox="1">
             <a:spLocks/>
           </p:cNvSpPr>
@@ -5046,8 +5081,8 @@
         </p:nvSpPr>
         <p:spPr>
           <a:xfrm>
-            <a:off x="825137" y="679270"/>
-            <a:ext cx="9977846" cy="992776"/>
+            <a:off x="2694214" y="169815"/>
+            <a:ext cx="7117080" cy="809897"/>
           </a:xfrm>
           <a:prstGeom prst="rect">
             <a:avLst/>
@@ -5065,7 +5100,7 @@
         </p:spPr>
         <p:txBody>
           <a:bodyPr vert="horz" lIns="91440" tIns="45720" rIns="91440" bIns="45720" rtlCol="0" anchor="b">
-            <a:normAutofit/>
+            <a:normAutofit fontScale="92500" lnSpcReduction="10000"/>
           </a:bodyPr>
           <a:lstStyle>
             <a:lvl1pPr algn="ctr" defTabSz="914400" rtl="0" eaLnBrk="1" latinLnBrk="0" hangingPunct="1">
@@ -5088,268 +5123,33 @@
           </a:lstStyle>
           <a:p>
             <a:r>
-              <a:rPr lang="pt-BR" b="1" dirty="0" err="1" smtClean="0">
-                <a:solidFill>
-                  <a:srgbClr val="FFFF00"/>
-                </a:solidFill>
-              </a:rPr>
-              <a:t>App.Controllers</a:t>
-            </a:r>
-            <a:r>
               <a:rPr lang="pt-BR" b="1" dirty="0" smtClean="0">
-                <a:solidFill>
-                  <a:srgbClr val="FFFF00"/>
-                </a:solidFill>
-              </a:rPr>
-              <a:t> </a:t>
-            </a:r>
-            <a:endParaRPr lang="pt-BR" b="1" dirty="0" smtClean="0">
-              <a:solidFill>
-                <a:srgbClr val="FFFF00"/>
-              </a:solidFill>
-            </a:endParaRPr>
-          </a:p>
-        </p:txBody>
-      </p:sp>
-      <p:pic>
-        <p:nvPicPr>
-          <p:cNvPr id="4" name="Imagem 3"/>
-          <p:cNvPicPr>
-            <a:picLocks noChangeAspect="1"/>
-          </p:cNvPicPr>
-          <p:nvPr/>
-        </p:nvPicPr>
-        <p:blipFill>
-          <a:blip r:embed="rId3"/>
-          <a:stretch>
-            <a:fillRect/>
-          </a:stretch>
-        </p:blipFill>
-        <p:spPr>
-          <a:xfrm>
-            <a:off x="224245" y="1934657"/>
-            <a:ext cx="3159034" cy="3630120"/>
-          </a:xfrm>
-          <a:prstGeom prst="rect">
-            <a:avLst/>
-          </a:prstGeom>
-        </p:spPr>
-      </p:pic>
-      <p:pic>
-        <p:nvPicPr>
-          <p:cNvPr id="8" name="Imagem 7"/>
-          <p:cNvPicPr>
-            <a:picLocks noChangeAspect="1"/>
-          </p:cNvPicPr>
-          <p:nvPr/>
-        </p:nvPicPr>
-        <p:blipFill>
-          <a:blip r:embed="rId4"/>
-          <a:stretch>
-            <a:fillRect/>
-          </a:stretch>
-        </p:blipFill>
-        <p:spPr>
-          <a:xfrm>
-            <a:off x="8119497" y="1914566"/>
-            <a:ext cx="3642362" cy="1788257"/>
-          </a:xfrm>
-          <a:prstGeom prst="rect">
-            <a:avLst/>
-          </a:prstGeom>
-        </p:spPr>
-      </p:pic>
-      <p:pic>
-        <p:nvPicPr>
-          <p:cNvPr id="10" name="Imagem 9"/>
-          <p:cNvPicPr>
-            <a:picLocks noChangeAspect="1"/>
-          </p:cNvPicPr>
-          <p:nvPr/>
-        </p:nvPicPr>
-        <p:blipFill>
-          <a:blip r:embed="rId5"/>
-          <a:stretch>
-            <a:fillRect/>
-          </a:stretch>
-        </p:blipFill>
-        <p:spPr>
-          <a:xfrm>
-            <a:off x="3815595" y="1914566"/>
-            <a:ext cx="3648584" cy="1808347"/>
-          </a:xfrm>
-          <a:prstGeom prst="rect">
-            <a:avLst/>
-          </a:prstGeom>
-        </p:spPr>
-      </p:pic>
-      <p:sp>
-        <p:nvSpPr>
-          <p:cNvPr id="11" name="Título 1"/>
-          <p:cNvSpPr txBox="1">
-            <a:spLocks/>
-          </p:cNvSpPr>
-          <p:nvPr/>
-        </p:nvSpPr>
-        <p:spPr>
-          <a:xfrm>
-            <a:off x="4197377" y="1552295"/>
-            <a:ext cx="2640874" cy="382362"/>
-          </a:xfrm>
-          <a:prstGeom prst="rect">
-            <a:avLst/>
-          </a:prstGeom>
-          <a:effectLst>
-            <a:reflection endPos="0" dir="5400000" sy="-100000" algn="bl" rotWithShape="0"/>
-          </a:effectLst>
-          <a:scene3d>
-            <a:camera prst="orthographicFront"/>
-            <a:lightRig rig="threePt" dir="t"/>
-          </a:scene3d>
-          <a:sp3d prstMaterial="dkEdge">
-            <a:bevelB w="0"/>
-          </a:sp3d>
-        </p:spPr>
-        <p:txBody>
-          <a:bodyPr vert="horz" lIns="91440" tIns="45720" rIns="91440" bIns="45720" rtlCol="0" anchor="b">
-            <a:normAutofit/>
-          </a:bodyPr>
-          <a:lstStyle>
-            <a:lvl1pPr algn="ctr" defTabSz="914400" rtl="0" eaLnBrk="1" latinLnBrk="0" hangingPunct="1">
-              <a:lnSpc>
-                <a:spcPct val="90000"/>
-              </a:lnSpc>
-              <a:spcBef>
-                <a:spcPct val="0"/>
-              </a:spcBef>
-              <a:buNone/>
-              <a:defRPr sz="6000" kern="1200">
-                <a:solidFill>
-                  <a:schemeClr val="tx1"/>
-                </a:solidFill>
-                <a:latin typeface="+mj-lt"/>
-                <a:ea typeface="+mj-ea"/>
-                <a:cs typeface="+mj-cs"/>
-              </a:defRPr>
-            </a:lvl1pPr>
-          </a:lstStyle>
-          <a:p>
-            <a:r>
-              <a:rPr lang="pt-BR" sz="2000" b="1" dirty="0" smtClean="0">
                 <a:solidFill>
                   <a:srgbClr val="FFFF00"/>
                 </a:solidFill>
               </a:rPr>
               <a:t>Antes</a:t>
             </a:r>
-            <a:r>
-              <a:rPr lang="pt-BR" sz="2000" b="1" dirty="0" smtClean="0">
-                <a:solidFill>
-                  <a:srgbClr val="FFFF00"/>
-                </a:solidFill>
-              </a:rPr>
-              <a:t> </a:t>
-            </a:r>
-            <a:endParaRPr lang="pt-BR" sz="2000" b="1" dirty="0" smtClean="0">
-              <a:solidFill>
-                <a:srgbClr val="FFFF00"/>
-              </a:solidFill>
-            </a:endParaRPr>
-          </a:p>
-        </p:txBody>
-      </p:sp>
-      <p:sp>
-        <p:nvSpPr>
-          <p:cNvPr id="12" name="Título 1"/>
-          <p:cNvSpPr txBox="1">
-            <a:spLocks/>
-          </p:cNvSpPr>
-          <p:nvPr/>
-        </p:nvSpPr>
-        <p:spPr>
-          <a:xfrm>
-            <a:off x="8558348" y="1532204"/>
-            <a:ext cx="2640874" cy="382362"/>
-          </a:xfrm>
-          <a:prstGeom prst="rect">
-            <a:avLst/>
-          </a:prstGeom>
-          <a:effectLst>
-            <a:reflection endPos="0" dir="5400000" sy="-100000" algn="bl" rotWithShape="0"/>
-          </a:effectLst>
-          <a:scene3d>
-            <a:camera prst="orthographicFront"/>
-            <a:lightRig rig="threePt" dir="t"/>
-          </a:scene3d>
-          <a:sp3d prstMaterial="dkEdge">
-            <a:bevelB w="0"/>
-          </a:sp3d>
-        </p:spPr>
-        <p:txBody>
-          <a:bodyPr vert="horz" lIns="91440" tIns="45720" rIns="91440" bIns="45720" rtlCol="0" anchor="b">
-            <a:normAutofit/>
-          </a:bodyPr>
-          <a:lstStyle>
-            <a:lvl1pPr algn="ctr" defTabSz="914400" rtl="0" eaLnBrk="1" latinLnBrk="0" hangingPunct="1">
-              <a:lnSpc>
-                <a:spcPct val="90000"/>
-              </a:lnSpc>
-              <a:spcBef>
-                <a:spcPct val="0"/>
-              </a:spcBef>
-              <a:buNone/>
-              <a:defRPr sz="6000" kern="1200">
-                <a:solidFill>
-                  <a:schemeClr val="tx1"/>
-                </a:solidFill>
-                <a:latin typeface="+mj-lt"/>
-                <a:ea typeface="+mj-ea"/>
-                <a:cs typeface="+mj-cs"/>
-              </a:defRPr>
-            </a:lvl1pPr>
-          </a:lstStyle>
-          <a:p>
-            <a:r>
-              <a:rPr lang="pt-BR" sz="2000" b="1" dirty="0" smtClean="0">
-                <a:solidFill>
-                  <a:srgbClr val="FFFF00"/>
-                </a:solidFill>
-              </a:rPr>
-              <a:t>Depois</a:t>
-            </a:r>
-            <a:r>
-              <a:rPr lang="pt-BR" sz="2000" b="1" dirty="0" smtClean="0">
-                <a:solidFill>
-                  <a:srgbClr val="FFFF00"/>
-                </a:solidFill>
-              </a:rPr>
-              <a:t> </a:t>
-            </a:r>
-            <a:endParaRPr lang="pt-BR" sz="2000" b="1" dirty="0" smtClean="0">
-              <a:solidFill>
-                <a:srgbClr val="FFFF00"/>
-              </a:solidFill>
-            </a:endParaRPr>
           </a:p>
         </p:txBody>
       </p:sp>
     </p:spTree>
     <p:extLst>
       <p:ext uri="{BB962C8B-B14F-4D97-AF65-F5344CB8AC3E}">
-        <p14:creationId xmlns:p14="http://schemas.microsoft.com/office/powerpoint/2010/main" val="2428721956"/>
+        <p14:creationId xmlns:p14="http://schemas.microsoft.com/office/powerpoint/2010/main" val="1585122224"/>
       </p:ext>
     </p:extLst>
   </p:cSld>
   <p:clrMapOvr>
     <a:masterClrMapping/>
   </p:clrMapOvr>
-  <mc:AlternateContent xmlns:mc="http://schemas.openxmlformats.org/markup-compatibility/2006">
-    <mc:Choice xmlns:p14="http://schemas.microsoft.com/office/powerpoint/2010/main" Requires="p14">
+  <mc:AlternateContent xmlns:mc="http://schemas.openxmlformats.org/markup-compatibility/2006" xmlns:p14="http://schemas.microsoft.com/office/powerpoint/2010/main">
+    <mc:Choice Requires="p14">
       <p:transition spd="slow" p14:dur="1250">
         <p14:switch dir="r"/>
       </p:transition>
     </mc:Choice>
-    <mc:Fallback>
+    <mc:Fallback xmlns="">
       <p:transition spd="slow">
         <p:fade/>
       </p:transition>
@@ -5414,7 +5214,7 @@
       </p:pic>
       <p:sp>
         <p:nvSpPr>
-          <p:cNvPr id="5" name="Título 1"/>
+          <p:cNvPr id="14" name="Título 1"/>
           <p:cNvSpPr txBox="1">
             <a:spLocks/>
           </p:cNvSpPr>
@@ -5422,8 +5222,8 @@
         </p:nvSpPr>
         <p:spPr>
           <a:xfrm>
-            <a:off x="838200" y="88260"/>
-            <a:ext cx="10515600" cy="953588"/>
+            <a:off x="2694214" y="169815"/>
+            <a:ext cx="7117080" cy="809897"/>
           </a:xfrm>
           <a:prstGeom prst="rect">
             <a:avLst/>
@@ -5441,7 +5241,7 @@
         </p:spPr>
         <p:txBody>
           <a:bodyPr vert="horz" lIns="91440" tIns="45720" rIns="91440" bIns="45720" rtlCol="0" anchor="b">
-            <a:normAutofit/>
+            <a:normAutofit fontScale="92500" lnSpcReduction="10000"/>
           </a:bodyPr>
           <a:lstStyle>
             <a:lvl1pPr algn="ctr" defTabSz="914400" rtl="0" eaLnBrk="1" latinLnBrk="0" hangingPunct="1">
@@ -5464,26 +5264,13 @@
           </a:lstStyle>
           <a:p>
             <a:r>
-              <a:rPr lang="pt-BR" b="1" dirty="0" err="1" smtClean="0">
+              <a:rPr lang="pt-BR" b="1" dirty="0" smtClean="0">
                 <a:solidFill>
                   <a:srgbClr val="FFFF00"/>
                 </a:solidFill>
               </a:rPr>
-              <a:t>App.Handlers</a:t>
-            </a:r>
-            <a:r>
-              <a:rPr lang="pt-BR" b="1" dirty="0" smtClean="0">
-                <a:solidFill>
-                  <a:srgbClr val="FFFF00"/>
-                </a:solidFill>
-              </a:rPr>
-              <a:t> </a:t>
-            </a:r>
-            <a:endParaRPr lang="pt-BR" b="1" dirty="0" smtClean="0">
-              <a:solidFill>
-                <a:srgbClr val="FFFF00"/>
-              </a:solidFill>
-            </a:endParaRPr>
+              <a:t>Depois</a:t>
+            </a:r>
           </a:p>
         </p:txBody>
       </p:sp>
@@ -5503,32 +5290,8 @@
         </p:blipFill>
         <p:spPr>
           <a:xfrm>
-            <a:off x="587828" y="1130108"/>
-            <a:ext cx="3174273" cy="3670662"/>
-          </a:xfrm>
-          <a:prstGeom prst="rect">
-            <a:avLst/>
-          </a:prstGeom>
-        </p:spPr>
-      </p:pic>
-      <p:pic>
-        <p:nvPicPr>
-          <p:cNvPr id="6" name="Imagem 5"/>
-          <p:cNvPicPr>
-            <a:picLocks noChangeAspect="1"/>
-          </p:cNvPicPr>
-          <p:nvPr/>
-        </p:nvPicPr>
-        <p:blipFill>
-          <a:blip r:embed="rId4"/>
-          <a:stretch>
-            <a:fillRect/>
-          </a:stretch>
-        </p:blipFill>
-        <p:spPr>
-          <a:xfrm>
-            <a:off x="4757662" y="1130108"/>
-            <a:ext cx="6935168" cy="4620270"/>
+            <a:off x="1528354" y="1047417"/>
+            <a:ext cx="9222377" cy="5601577"/>
           </a:xfrm>
           <a:prstGeom prst="rect">
             <a:avLst/>
@@ -5538,20 +5301,20 @@
     </p:spTree>
     <p:extLst>
       <p:ext uri="{BB962C8B-B14F-4D97-AF65-F5344CB8AC3E}">
-        <p14:creationId xmlns:p14="http://schemas.microsoft.com/office/powerpoint/2010/main" val="1963959923"/>
+        <p14:creationId xmlns:p14="http://schemas.microsoft.com/office/powerpoint/2010/main" val="2155782042"/>
       </p:ext>
     </p:extLst>
   </p:cSld>
   <p:clrMapOvr>
     <a:masterClrMapping/>
   </p:clrMapOvr>
-  <mc:AlternateContent xmlns:mc="http://schemas.openxmlformats.org/markup-compatibility/2006">
-    <mc:Choice xmlns:p14="http://schemas.microsoft.com/office/powerpoint/2010/main" Requires="p14">
+  <mc:AlternateContent xmlns:mc="http://schemas.openxmlformats.org/markup-compatibility/2006" xmlns:p14="http://schemas.microsoft.com/office/powerpoint/2010/main">
+    <mc:Choice Requires="p14">
       <p:transition spd="slow" p14:dur="1250">
         <p14:switch dir="r"/>
       </p:transition>
     </mc:Choice>
-    <mc:Fallback>
+    <mc:Fallback xmlns="">
       <p:transition spd="slow">
         <p:fade/>
       </p:transition>
@@ -5616,7 +5379,7 @@
       </p:pic>
       <p:sp>
         <p:nvSpPr>
-          <p:cNvPr id="5" name="Título 1"/>
+          <p:cNvPr id="6" name="Título 1"/>
           <p:cNvSpPr txBox="1">
             <a:spLocks/>
           </p:cNvSpPr>
@@ -5624,8 +5387,8 @@
         </p:nvSpPr>
         <p:spPr>
           <a:xfrm>
-            <a:off x="838200" y="428148"/>
-            <a:ext cx="10515600" cy="953588"/>
+            <a:off x="812075" y="259669"/>
+            <a:ext cx="9977846" cy="992776"/>
           </a:xfrm>
           <a:prstGeom prst="rect">
             <a:avLst/>
@@ -5671,7 +5434,7 @@
                   <a:srgbClr val="FFFF00"/>
                 </a:solidFill>
               </a:rPr>
-              <a:t>Domain.Interface.Repository</a:t>
+              <a:t>App.Controllers</a:t>
             </a:r>
             <a:r>
               <a:rPr lang="pt-BR" b="1" dirty="0" smtClean="0">
@@ -5681,17 +5444,12 @@
               </a:rPr>
               <a:t> </a:t>
             </a:r>
-            <a:endParaRPr lang="pt-BR" b="1" dirty="0" smtClean="0">
-              <a:solidFill>
-                <a:srgbClr val="FFFF00"/>
-              </a:solidFill>
-            </a:endParaRPr>
           </a:p>
         </p:txBody>
       </p:sp>
       <p:pic>
         <p:nvPicPr>
-          <p:cNvPr id="2" name="Imagem 1"/>
+          <p:cNvPr id="4" name="Imagem 3"/>
           <p:cNvPicPr>
             <a:picLocks noChangeAspect="1"/>
           </p:cNvPicPr>
@@ -5705,8 +5463,8 @@
         </p:blipFill>
         <p:spPr>
           <a:xfrm>
-            <a:off x="623187" y="1632858"/>
-            <a:ext cx="2219635" cy="3591426"/>
+            <a:off x="224245" y="1934657"/>
+            <a:ext cx="3159034" cy="3630120"/>
           </a:xfrm>
           <a:prstGeom prst="rect">
             <a:avLst/>
@@ -5715,7 +5473,7 @@
       </p:pic>
       <p:pic>
         <p:nvPicPr>
-          <p:cNvPr id="3" name="Imagem 2"/>
+          <p:cNvPr id="8" name="Imagem 7"/>
           <p:cNvPicPr>
             <a:picLocks noChangeAspect="1"/>
           </p:cNvPicPr>
@@ -5729,8 +5487,8 @@
         </p:blipFill>
         <p:spPr>
           <a:xfrm>
-            <a:off x="3198674" y="1632858"/>
-            <a:ext cx="3286584" cy="2667372"/>
+            <a:off x="8119497" y="1914566"/>
+            <a:ext cx="3642362" cy="1788257"/>
           </a:xfrm>
           <a:prstGeom prst="rect">
             <a:avLst/>
@@ -5739,7 +5497,7 @@
       </p:pic>
       <p:pic>
         <p:nvPicPr>
-          <p:cNvPr id="4" name="Imagem 3"/>
+          <p:cNvPr id="10" name="Imagem 9"/>
           <p:cNvPicPr>
             <a:picLocks noChangeAspect="1"/>
           </p:cNvPicPr>
@@ -5753,79 +5511,155 @@
         </p:blipFill>
         <p:spPr>
           <a:xfrm>
-            <a:off x="7012495" y="1645236"/>
-            <a:ext cx="3801005" cy="724001"/>
+            <a:off x="3815595" y="1914566"/>
+            <a:ext cx="3648584" cy="1808347"/>
           </a:xfrm>
           <a:prstGeom prst="rect">
             <a:avLst/>
           </a:prstGeom>
         </p:spPr>
       </p:pic>
-      <p:pic>
-        <p:nvPicPr>
-          <p:cNvPr id="6" name="Imagem 5"/>
-          <p:cNvPicPr>
-            <a:picLocks noChangeAspect="1"/>
-          </p:cNvPicPr>
-          <p:nvPr/>
-        </p:nvPicPr>
-        <p:blipFill>
-          <a:blip r:embed="rId6"/>
-          <a:stretch>
-            <a:fillRect/>
-          </a:stretch>
-        </p:blipFill>
-        <p:spPr>
-          <a:xfrm>
-            <a:off x="7012495" y="2557707"/>
-            <a:ext cx="4029637" cy="2343477"/>
-          </a:xfrm>
-          <a:prstGeom prst="rect">
-            <a:avLst/>
-          </a:prstGeom>
-        </p:spPr>
-      </p:pic>
-      <p:pic>
-        <p:nvPicPr>
-          <p:cNvPr id="8" name="Imagem 7"/>
-          <p:cNvPicPr>
-            <a:picLocks noChangeAspect="1"/>
-          </p:cNvPicPr>
-          <p:nvPr/>
-        </p:nvPicPr>
-        <p:blipFill>
-          <a:blip r:embed="rId7"/>
-          <a:stretch>
-            <a:fillRect/>
-          </a:stretch>
-        </p:blipFill>
-        <p:spPr>
-          <a:xfrm>
-            <a:off x="7012495" y="5140137"/>
-            <a:ext cx="4058216" cy="685896"/>
-          </a:xfrm>
-          <a:prstGeom prst="rect">
-            <a:avLst/>
-          </a:prstGeom>
-        </p:spPr>
-      </p:pic>
+      <p:sp>
+        <p:nvSpPr>
+          <p:cNvPr id="11" name="Título 1"/>
+          <p:cNvSpPr txBox="1">
+            <a:spLocks/>
+          </p:cNvSpPr>
+          <p:nvPr/>
+        </p:nvSpPr>
+        <p:spPr>
+          <a:xfrm>
+            <a:off x="4197377" y="1552295"/>
+            <a:ext cx="2640874" cy="382362"/>
+          </a:xfrm>
+          <a:prstGeom prst="rect">
+            <a:avLst/>
+          </a:prstGeom>
+          <a:effectLst>
+            <a:reflection endPos="0" dir="5400000" sy="-100000" algn="bl" rotWithShape="0"/>
+          </a:effectLst>
+          <a:scene3d>
+            <a:camera prst="orthographicFront"/>
+            <a:lightRig rig="threePt" dir="t"/>
+          </a:scene3d>
+          <a:sp3d prstMaterial="dkEdge">
+            <a:bevelB w="0"/>
+          </a:sp3d>
+        </p:spPr>
+        <p:txBody>
+          <a:bodyPr vert="horz" lIns="91440" tIns="45720" rIns="91440" bIns="45720" rtlCol="0" anchor="b">
+            <a:normAutofit/>
+          </a:bodyPr>
+          <a:lstStyle>
+            <a:lvl1pPr algn="ctr" defTabSz="914400" rtl="0" eaLnBrk="1" latinLnBrk="0" hangingPunct="1">
+              <a:lnSpc>
+                <a:spcPct val="90000"/>
+              </a:lnSpc>
+              <a:spcBef>
+                <a:spcPct val="0"/>
+              </a:spcBef>
+              <a:buNone/>
+              <a:defRPr sz="6000" kern="1200">
+                <a:solidFill>
+                  <a:schemeClr val="tx1"/>
+                </a:solidFill>
+                <a:latin typeface="+mj-lt"/>
+                <a:ea typeface="+mj-ea"/>
+                <a:cs typeface="+mj-cs"/>
+              </a:defRPr>
+            </a:lvl1pPr>
+          </a:lstStyle>
+          <a:p>
+            <a:r>
+              <a:rPr lang="pt-BR" sz="2000" b="1" dirty="0" smtClean="0">
+                <a:solidFill>
+                  <a:srgbClr val="FFFF00"/>
+                </a:solidFill>
+              </a:rPr>
+              <a:t>Antes </a:t>
+            </a:r>
+          </a:p>
+        </p:txBody>
+      </p:sp>
+      <p:sp>
+        <p:nvSpPr>
+          <p:cNvPr id="12" name="Título 1"/>
+          <p:cNvSpPr txBox="1">
+            <a:spLocks/>
+          </p:cNvSpPr>
+          <p:nvPr/>
+        </p:nvSpPr>
+        <p:spPr>
+          <a:xfrm>
+            <a:off x="8558348" y="1532204"/>
+            <a:ext cx="2640874" cy="382362"/>
+          </a:xfrm>
+          <a:prstGeom prst="rect">
+            <a:avLst/>
+          </a:prstGeom>
+          <a:effectLst>
+            <a:reflection endPos="0" dir="5400000" sy="-100000" algn="bl" rotWithShape="0"/>
+          </a:effectLst>
+          <a:scene3d>
+            <a:camera prst="orthographicFront"/>
+            <a:lightRig rig="threePt" dir="t"/>
+          </a:scene3d>
+          <a:sp3d prstMaterial="dkEdge">
+            <a:bevelB w="0"/>
+          </a:sp3d>
+        </p:spPr>
+        <p:txBody>
+          <a:bodyPr vert="horz" lIns="91440" tIns="45720" rIns="91440" bIns="45720" rtlCol="0" anchor="b">
+            <a:normAutofit/>
+          </a:bodyPr>
+          <a:lstStyle>
+            <a:lvl1pPr algn="ctr" defTabSz="914400" rtl="0" eaLnBrk="1" latinLnBrk="0" hangingPunct="1">
+              <a:lnSpc>
+                <a:spcPct val="90000"/>
+              </a:lnSpc>
+              <a:spcBef>
+                <a:spcPct val="0"/>
+              </a:spcBef>
+              <a:buNone/>
+              <a:defRPr sz="6000" kern="1200">
+                <a:solidFill>
+                  <a:schemeClr val="tx1"/>
+                </a:solidFill>
+                <a:latin typeface="+mj-lt"/>
+                <a:ea typeface="+mj-ea"/>
+                <a:cs typeface="+mj-cs"/>
+              </a:defRPr>
+            </a:lvl1pPr>
+          </a:lstStyle>
+          <a:p>
+            <a:r>
+              <a:rPr lang="pt-BR" sz="2000" b="1" dirty="0" smtClean="0">
+                <a:solidFill>
+                  <a:srgbClr val="FFFF00"/>
+                </a:solidFill>
+              </a:rPr>
+              <a:t>Depois </a:t>
+            </a:r>
+          </a:p>
+        </p:txBody>
+      </p:sp>
     </p:spTree>
     <p:extLst>
       <p:ext uri="{BB962C8B-B14F-4D97-AF65-F5344CB8AC3E}">
-        <p14:creationId xmlns:p14="http://schemas.microsoft.com/office/powerpoint/2010/main" val="1155592565"/>
+        <p14:creationId xmlns:p14="http://schemas.microsoft.com/office/powerpoint/2010/main" val="2428721956"/>
       </p:ext>
     </p:extLst>
   </p:cSld>
   <p:clrMapOvr>
     <a:masterClrMapping/>
   </p:clrMapOvr>
-  <mc:AlternateContent xmlns:mc="http://schemas.openxmlformats.org/markup-compatibility/2006">
-    <mc:Choice xmlns:p14="http://schemas.microsoft.com/office/powerpoint/2010/main" Requires="p14">
+  <mc:AlternateContent xmlns:mc="http://schemas.openxmlformats.org/markup-compatibility/2006" xmlns:p14="http://schemas.microsoft.com/office/powerpoint/2010/main">
+    <mc:Choice Requires="p14">
       <p:transition spd="slow" p14:dur="1250">
         <p14:switch dir="r"/>
       </p:transition>
     </mc:Choice>
-    <mc:Fallback>
+    <mc:Fallback xmlns="">
       <p:transition spd="slow">
         <p:fade/>
       </p:transition>
@@ -5898,7 +5732,7 @@
         </p:nvSpPr>
         <p:spPr>
           <a:xfrm>
-            <a:off x="825137" y="679270"/>
+            <a:off x="838200" y="88260"/>
             <a:ext cx="10515600" cy="953588"/>
           </a:xfrm>
           <a:prstGeom prst="rect">
@@ -5945,7 +5779,7 @@
                   <a:srgbClr val="FFFF00"/>
                 </a:solidFill>
               </a:rPr>
-              <a:t>Infra.Repository</a:t>
+              <a:t>App.Handlers</a:t>
             </a:r>
             <a:r>
               <a:rPr lang="pt-BR" b="1" dirty="0" smtClean="0">
@@ -5955,17 +5789,12 @@
               </a:rPr>
               <a:t> </a:t>
             </a:r>
-            <a:endParaRPr lang="pt-BR" b="1" dirty="0" smtClean="0">
-              <a:solidFill>
-                <a:srgbClr val="FFFF00"/>
-              </a:solidFill>
-            </a:endParaRPr>
           </a:p>
         </p:txBody>
       </p:sp>
       <p:pic>
         <p:nvPicPr>
-          <p:cNvPr id="4" name="Imagem 3"/>
+          <p:cNvPr id="2" name="Imagem 1"/>
           <p:cNvPicPr>
             <a:picLocks noChangeAspect="1"/>
           </p:cNvPicPr>
@@ -5979,8 +5808,32 @@
         </p:blipFill>
         <p:spPr>
           <a:xfrm>
-            <a:off x="3291841" y="1847629"/>
-            <a:ext cx="4761820" cy="4187411"/>
+            <a:off x="587828" y="1130108"/>
+            <a:ext cx="3174273" cy="3670662"/>
+          </a:xfrm>
+          <a:prstGeom prst="rect">
+            <a:avLst/>
+          </a:prstGeom>
+        </p:spPr>
+      </p:pic>
+      <p:pic>
+        <p:nvPicPr>
+          <p:cNvPr id="6" name="Imagem 5"/>
+          <p:cNvPicPr>
+            <a:picLocks noChangeAspect="1"/>
+          </p:cNvPicPr>
+          <p:nvPr/>
+        </p:nvPicPr>
+        <p:blipFill>
+          <a:blip r:embed="rId4"/>
+          <a:stretch>
+            <a:fillRect/>
+          </a:stretch>
+        </p:blipFill>
+        <p:spPr>
+          <a:xfrm>
+            <a:off x="4757662" y="1130108"/>
+            <a:ext cx="6935168" cy="4620270"/>
           </a:xfrm>
           <a:prstGeom prst="rect">
             <a:avLst/>
@@ -5990,20 +5843,20 @@
     </p:spTree>
     <p:extLst>
       <p:ext uri="{BB962C8B-B14F-4D97-AF65-F5344CB8AC3E}">
-        <p14:creationId xmlns:p14="http://schemas.microsoft.com/office/powerpoint/2010/main" val="3338401549"/>
+        <p14:creationId xmlns:p14="http://schemas.microsoft.com/office/powerpoint/2010/main" val="1963959923"/>
       </p:ext>
     </p:extLst>
   </p:cSld>
   <p:clrMapOvr>
     <a:masterClrMapping/>
   </p:clrMapOvr>
-  <mc:AlternateContent xmlns:mc="http://schemas.openxmlformats.org/markup-compatibility/2006">
-    <mc:Choice xmlns:p14="http://schemas.microsoft.com/office/powerpoint/2010/main" Requires="p14">
+  <mc:AlternateContent xmlns:mc="http://schemas.openxmlformats.org/markup-compatibility/2006" xmlns:p14="http://schemas.microsoft.com/office/powerpoint/2010/main">
+    <mc:Choice Requires="p14">
       <p:transition spd="slow" p14:dur="1250">
         <p14:switch dir="r"/>
       </p:transition>
     </mc:Choice>
-    <mc:Fallback>
+    <mc:Fallback xmlns="">
       <p:transition spd="slow">
         <p:fade/>
       </p:transition>
@@ -6076,7 +5929,7 @@
         </p:nvSpPr>
         <p:spPr>
           <a:xfrm>
-            <a:off x="825137" y="679270"/>
+            <a:off x="838200" y="428148"/>
             <a:ext cx="10515600" cy="953588"/>
           </a:xfrm>
           <a:prstGeom prst="rect">
@@ -6123,7 +5976,7 @@
                   <a:srgbClr val="FFFF00"/>
                 </a:solidFill>
               </a:rPr>
-              <a:t>Domain.Interface.Service</a:t>
+              <a:t>Domain.Interface.Repository</a:t>
             </a:r>
             <a:r>
               <a:rPr lang="pt-BR" b="1" dirty="0" smtClean="0">
@@ -6133,11 +5986,6 @@
               </a:rPr>
               <a:t> </a:t>
             </a:r>
-            <a:endParaRPr lang="pt-BR" b="1" dirty="0" smtClean="0">
-              <a:solidFill>
-                <a:srgbClr val="FFFF00"/>
-              </a:solidFill>
-            </a:endParaRPr>
           </a:p>
         </p:txBody>
       </p:sp>
@@ -6157,8 +6005,8 @@
         </p:blipFill>
         <p:spPr>
           <a:xfrm>
-            <a:off x="227703" y="1893524"/>
-            <a:ext cx="3115110" cy="2600688"/>
+            <a:off x="623187" y="1632858"/>
+            <a:ext cx="2219635" cy="3591426"/>
           </a:xfrm>
           <a:prstGeom prst="rect">
             <a:avLst/>
@@ -6181,8 +6029,8 @@
         </p:blipFill>
         <p:spPr>
           <a:xfrm>
-            <a:off x="3612739" y="1893524"/>
-            <a:ext cx="3658111" cy="1486107"/>
+            <a:off x="3198674" y="1632858"/>
+            <a:ext cx="3286584" cy="2667372"/>
           </a:xfrm>
           <a:prstGeom prst="rect">
             <a:avLst/>
@@ -6205,8 +6053,56 @@
         </p:blipFill>
         <p:spPr>
           <a:xfrm>
-            <a:off x="7540777" y="1893524"/>
-            <a:ext cx="4429743" cy="3124636"/>
+            <a:off x="7012495" y="1645236"/>
+            <a:ext cx="3801005" cy="724001"/>
+          </a:xfrm>
+          <a:prstGeom prst="rect">
+            <a:avLst/>
+          </a:prstGeom>
+        </p:spPr>
+      </p:pic>
+      <p:pic>
+        <p:nvPicPr>
+          <p:cNvPr id="6" name="Imagem 5"/>
+          <p:cNvPicPr>
+            <a:picLocks noChangeAspect="1"/>
+          </p:cNvPicPr>
+          <p:nvPr/>
+        </p:nvPicPr>
+        <p:blipFill>
+          <a:blip r:embed="rId6"/>
+          <a:stretch>
+            <a:fillRect/>
+          </a:stretch>
+        </p:blipFill>
+        <p:spPr>
+          <a:xfrm>
+            <a:off x="7012495" y="2557707"/>
+            <a:ext cx="4029637" cy="2343477"/>
+          </a:xfrm>
+          <a:prstGeom prst="rect">
+            <a:avLst/>
+          </a:prstGeom>
+        </p:spPr>
+      </p:pic>
+      <p:pic>
+        <p:nvPicPr>
+          <p:cNvPr id="8" name="Imagem 7"/>
+          <p:cNvPicPr>
+            <a:picLocks noChangeAspect="1"/>
+          </p:cNvPicPr>
+          <p:nvPr/>
+        </p:nvPicPr>
+        <p:blipFill>
+          <a:blip r:embed="rId7"/>
+          <a:stretch>
+            <a:fillRect/>
+          </a:stretch>
+        </p:blipFill>
+        <p:spPr>
+          <a:xfrm>
+            <a:off x="7012495" y="5140137"/>
+            <a:ext cx="4058216" cy="685896"/>
           </a:xfrm>
           <a:prstGeom prst="rect">
             <a:avLst/>
@@ -6216,20 +6112,20 @@
     </p:spTree>
     <p:extLst>
       <p:ext uri="{BB962C8B-B14F-4D97-AF65-F5344CB8AC3E}">
-        <p14:creationId xmlns:p14="http://schemas.microsoft.com/office/powerpoint/2010/main" val="3145480138"/>
+        <p14:creationId xmlns:p14="http://schemas.microsoft.com/office/powerpoint/2010/main" val="1155592565"/>
       </p:ext>
     </p:extLst>
   </p:cSld>
   <p:clrMapOvr>
     <a:masterClrMapping/>
   </p:clrMapOvr>
-  <mc:AlternateContent xmlns:mc="http://schemas.openxmlformats.org/markup-compatibility/2006">
-    <mc:Choice xmlns:p14="http://schemas.microsoft.com/office/powerpoint/2010/main" Requires="p14">
+  <mc:AlternateContent xmlns:mc="http://schemas.openxmlformats.org/markup-compatibility/2006" xmlns:p14="http://schemas.microsoft.com/office/powerpoint/2010/main">
+    <mc:Choice Requires="p14">
       <p:transition spd="slow" p14:dur="1250">
         <p14:switch dir="r"/>
       </p:transition>
     </mc:Choice>
-    <mc:Fallback>
+    <mc:Fallback xmlns="">
       <p:transition spd="slow">
         <p:fade/>
       </p:transition>
@@ -6302,155 +6198,8 @@
         </p:nvSpPr>
         <p:spPr>
           <a:xfrm>
-            <a:off x="1294970" y="124097"/>
-            <a:ext cx="10515600" cy="692331"/>
-          </a:xfrm>
-          <a:prstGeom prst="rect">
-            <a:avLst/>
-          </a:prstGeom>
-          <a:effectLst>
-            <a:reflection endPos="0" dir="5400000" sy="-100000" algn="bl" rotWithShape="0"/>
-          </a:effectLst>
-          <a:scene3d>
-            <a:camera prst="orthographicFront"/>
-            <a:lightRig rig="threePt" dir="t"/>
-          </a:scene3d>
-          <a:sp3d prstMaterial="dkEdge">
-            <a:bevelB w="0"/>
-          </a:sp3d>
-        </p:spPr>
-        <p:txBody>
-          <a:bodyPr vert="horz" lIns="91440" tIns="45720" rIns="91440" bIns="45720" rtlCol="0" anchor="b">
-            <a:normAutofit fontScale="92500" lnSpcReduction="20000"/>
-          </a:bodyPr>
-          <a:lstStyle>
-            <a:lvl1pPr algn="ctr" defTabSz="914400" rtl="0" eaLnBrk="1" latinLnBrk="0" hangingPunct="1">
-              <a:lnSpc>
-                <a:spcPct val="90000"/>
-              </a:lnSpc>
-              <a:spcBef>
-                <a:spcPct val="0"/>
-              </a:spcBef>
-              <a:buNone/>
-              <a:defRPr sz="6000" kern="1200">
-                <a:solidFill>
-                  <a:schemeClr val="tx1"/>
-                </a:solidFill>
-                <a:latin typeface="+mj-lt"/>
-                <a:ea typeface="+mj-ea"/>
-                <a:cs typeface="+mj-cs"/>
-              </a:defRPr>
-            </a:lvl1pPr>
-          </a:lstStyle>
-          <a:p>
-            <a:r>
-              <a:rPr lang="pt-BR" b="1" dirty="0" smtClean="0">
-                <a:solidFill>
-                  <a:srgbClr val="FFFF00"/>
-                </a:solidFill>
-              </a:rPr>
-              <a:t>Services</a:t>
-            </a:r>
-            <a:r>
-              <a:rPr lang="pt-BR" b="1" dirty="0" smtClean="0">
-                <a:solidFill>
-                  <a:srgbClr val="FFFF00"/>
-                </a:solidFill>
-              </a:rPr>
-              <a:t> </a:t>
-            </a:r>
-            <a:endParaRPr lang="pt-BR" b="1" dirty="0" smtClean="0">
-              <a:solidFill>
-                <a:srgbClr val="FFFF00"/>
-              </a:solidFill>
-            </a:endParaRPr>
-          </a:p>
-        </p:txBody>
-      </p:sp>
-      <p:pic>
-        <p:nvPicPr>
-          <p:cNvPr id="4" name="Imagem 3"/>
-          <p:cNvPicPr>
-            <a:picLocks noChangeAspect="1"/>
-          </p:cNvPicPr>
-          <p:nvPr/>
-        </p:nvPicPr>
-        <p:blipFill>
-          <a:blip r:embed="rId3"/>
-          <a:stretch>
-            <a:fillRect/>
-          </a:stretch>
-        </p:blipFill>
-        <p:spPr>
-          <a:xfrm>
-            <a:off x="199548" y="470263"/>
-            <a:ext cx="4887007" cy="4297681"/>
-          </a:xfrm>
-          <a:prstGeom prst="rect">
-            <a:avLst/>
-          </a:prstGeom>
-        </p:spPr>
-      </p:pic>
-      <p:pic>
-        <p:nvPicPr>
-          <p:cNvPr id="8" name="Imagem 7"/>
-          <p:cNvPicPr>
-            <a:picLocks noChangeAspect="1"/>
-          </p:cNvPicPr>
-          <p:nvPr/>
-        </p:nvPicPr>
-        <p:blipFill>
-          <a:blip r:embed="rId4"/>
-          <a:stretch>
-            <a:fillRect/>
-          </a:stretch>
-        </p:blipFill>
-        <p:spPr>
-          <a:xfrm>
-            <a:off x="199548" y="4767944"/>
-            <a:ext cx="4887007" cy="1981679"/>
-          </a:xfrm>
-          <a:prstGeom prst="rect">
-            <a:avLst/>
-          </a:prstGeom>
-        </p:spPr>
-      </p:pic>
-      <p:pic>
-        <p:nvPicPr>
-          <p:cNvPr id="9" name="Imagem 8"/>
-          <p:cNvPicPr>
-            <a:picLocks noChangeAspect="1"/>
-          </p:cNvPicPr>
-          <p:nvPr/>
-        </p:nvPicPr>
-        <p:blipFill>
-          <a:blip r:embed="rId5"/>
-          <a:stretch>
-            <a:fillRect/>
-          </a:stretch>
-        </p:blipFill>
-        <p:spPr>
-          <a:xfrm>
-            <a:off x="8064633" y="764717"/>
-            <a:ext cx="3458058" cy="5325218"/>
-          </a:xfrm>
-          <a:prstGeom prst="rect">
-            <a:avLst/>
-          </a:prstGeom>
-        </p:spPr>
-      </p:pic>
-      <p:sp>
-        <p:nvSpPr>
-          <p:cNvPr id="10" name="Título 1"/>
-          <p:cNvSpPr txBox="1">
-            <a:spLocks/>
-          </p:cNvSpPr>
-          <p:nvPr/>
-        </p:nvSpPr>
-        <p:spPr>
-          <a:xfrm>
-            <a:off x="1072901" y="-222069"/>
-            <a:ext cx="2589053" cy="692331"/>
+            <a:off x="825137" y="679270"/>
+            <a:ext cx="10515600" cy="953588"/>
           </a:xfrm>
           <a:prstGeom prst="rect">
             <a:avLst/>
@@ -6491,113 +6240,65 @@
           </a:lstStyle>
           <a:p>
             <a:r>
-              <a:rPr lang="pt-BR" sz="2800" b="1" dirty="0" smtClean="0">
+              <a:rPr lang="pt-BR" b="1" dirty="0" err="1" smtClean="0">
                 <a:solidFill>
                   <a:srgbClr val="FFFF00"/>
                 </a:solidFill>
               </a:rPr>
-              <a:t>Antes</a:t>
-            </a:r>
-            <a:r>
-              <a:rPr lang="pt-BR" sz="2800" b="1" dirty="0" smtClean="0">
+              <a:t>Infra.Repository</a:t>
+            </a:r>
+            <a:r>
+              <a:rPr lang="pt-BR" b="1" dirty="0" smtClean="0">
                 <a:solidFill>
                   <a:srgbClr val="FFFF00"/>
                 </a:solidFill>
               </a:rPr>
               <a:t> </a:t>
             </a:r>
-            <a:endParaRPr lang="pt-BR" sz="2800" b="1" dirty="0" smtClean="0">
-              <a:solidFill>
-                <a:srgbClr val="FFFF00"/>
-              </a:solidFill>
-            </a:endParaRPr>
-          </a:p>
-        </p:txBody>
-      </p:sp>
-      <p:sp>
-        <p:nvSpPr>
-          <p:cNvPr id="11" name="Título 1"/>
-          <p:cNvSpPr txBox="1">
-            <a:spLocks/>
-          </p:cNvSpPr>
-          <p:nvPr/>
-        </p:nvSpPr>
-        <p:spPr>
-          <a:xfrm>
-            <a:off x="8499136" y="-38649"/>
-            <a:ext cx="2589053" cy="692331"/>
-          </a:xfrm>
-          <a:prstGeom prst="rect">
-            <a:avLst/>
-          </a:prstGeom>
-          <a:effectLst>
-            <a:reflection endPos="0" dir="5400000" sy="-100000" algn="bl" rotWithShape="0"/>
-          </a:effectLst>
-          <a:scene3d>
-            <a:camera prst="orthographicFront"/>
-            <a:lightRig rig="threePt" dir="t"/>
-          </a:scene3d>
-          <a:sp3d prstMaterial="dkEdge">
-            <a:bevelB w="0"/>
-          </a:sp3d>
-        </p:spPr>
-        <p:txBody>
-          <a:bodyPr vert="horz" lIns="91440" tIns="45720" rIns="91440" bIns="45720" rtlCol="0" anchor="b">
-            <a:normAutofit/>
-          </a:bodyPr>
-          <a:lstStyle>
-            <a:lvl1pPr algn="ctr" defTabSz="914400" rtl="0" eaLnBrk="1" latinLnBrk="0" hangingPunct="1">
-              <a:lnSpc>
-                <a:spcPct val="90000"/>
-              </a:lnSpc>
-              <a:spcBef>
-                <a:spcPct val="0"/>
-              </a:spcBef>
-              <a:buNone/>
-              <a:defRPr sz="6000" kern="1200">
-                <a:solidFill>
-                  <a:schemeClr val="tx1"/>
-                </a:solidFill>
-                <a:latin typeface="+mj-lt"/>
-                <a:ea typeface="+mj-ea"/>
-                <a:cs typeface="+mj-cs"/>
-              </a:defRPr>
-            </a:lvl1pPr>
-          </a:lstStyle>
-          <a:p>
-            <a:r>
-              <a:rPr lang="pt-BR" sz="2800" b="1" dirty="0" smtClean="0">
-                <a:solidFill>
-                  <a:srgbClr val="FFFF00"/>
-                </a:solidFill>
-              </a:rPr>
-              <a:t>Depois </a:t>
-            </a:r>
-            <a:endParaRPr lang="pt-BR" sz="2800" b="1" dirty="0" smtClean="0">
-              <a:solidFill>
-                <a:srgbClr val="FFFF00"/>
-              </a:solidFill>
-            </a:endParaRPr>
-          </a:p>
-        </p:txBody>
-      </p:sp>
+          </a:p>
+        </p:txBody>
+      </p:sp>
+      <p:pic>
+        <p:nvPicPr>
+          <p:cNvPr id="4" name="Imagem 3"/>
+          <p:cNvPicPr>
+            <a:picLocks noChangeAspect="1"/>
+          </p:cNvPicPr>
+          <p:nvPr/>
+        </p:nvPicPr>
+        <p:blipFill>
+          <a:blip r:embed="rId3"/>
+          <a:stretch>
+            <a:fillRect/>
+          </a:stretch>
+        </p:blipFill>
+        <p:spPr>
+          <a:xfrm>
+            <a:off x="3291841" y="1847629"/>
+            <a:ext cx="4761820" cy="4187411"/>
+          </a:xfrm>
+          <a:prstGeom prst="rect">
+            <a:avLst/>
+          </a:prstGeom>
+        </p:spPr>
+      </p:pic>
     </p:spTree>
     <p:extLst>
       <p:ext uri="{BB962C8B-B14F-4D97-AF65-F5344CB8AC3E}">
-        <p14:creationId xmlns:p14="http://schemas.microsoft.com/office/powerpoint/2010/main" val="1900257267"/>
+        <p14:creationId xmlns:p14="http://schemas.microsoft.com/office/powerpoint/2010/main" val="3338401549"/>
       </p:ext>
     </p:extLst>
   </p:cSld>
   <p:clrMapOvr>
     <a:masterClrMapping/>
   </p:clrMapOvr>
-  <mc:AlternateContent xmlns:mc="http://schemas.openxmlformats.org/markup-compatibility/2006">
-    <mc:Choice xmlns:p14="http://schemas.microsoft.com/office/powerpoint/2010/main" Requires="p14">
+  <mc:AlternateContent xmlns:mc="http://schemas.openxmlformats.org/markup-compatibility/2006" xmlns:p14="http://schemas.microsoft.com/office/powerpoint/2010/main">
+    <mc:Choice Requires="p14">
       <p:transition spd="slow" p14:dur="1250">
         <p14:switch dir="r"/>
       </p:transition>
     </mc:Choice>
-    <mc:Fallback>
+    <mc:Fallback xmlns="">
       <p:transition spd="slow">
         <p:fade/>
       </p:transition>
@@ -6670,7 +6371,7 @@
         </p:nvSpPr>
         <p:spPr>
           <a:xfrm>
-            <a:off x="720635" y="117567"/>
+            <a:off x="825137" y="679270"/>
             <a:ext cx="10515600" cy="953588"/>
           </a:xfrm>
           <a:prstGeom prst="rect">
@@ -6717,7 +6418,7 @@
                   <a:srgbClr val="FFFF00"/>
                 </a:solidFill>
               </a:rPr>
-              <a:t>Domain.Commands</a:t>
+              <a:t>Domain.Interface.Service</a:t>
             </a:r>
             <a:r>
               <a:rPr lang="pt-BR" b="1" dirty="0" smtClean="0">
@@ -6727,11 +6428,6 @@
               </a:rPr>
               <a:t> </a:t>
             </a:r>
-            <a:endParaRPr lang="pt-BR" b="1" dirty="0" smtClean="0">
-              <a:solidFill>
-                <a:srgbClr val="FFFF00"/>
-              </a:solidFill>
-            </a:endParaRPr>
           </a:p>
         </p:txBody>
       </p:sp>
@@ -6751,8 +6447,8 @@
         </p:blipFill>
         <p:spPr>
           <a:xfrm>
-            <a:off x="414237" y="1463041"/>
-            <a:ext cx="2162477" cy="2247912"/>
+            <a:off x="227703" y="1893524"/>
+            <a:ext cx="3115110" cy="2600688"/>
           </a:xfrm>
           <a:prstGeom prst="rect">
             <a:avLst/>
@@ -6775,8 +6471,8 @@
         </p:blipFill>
         <p:spPr>
           <a:xfrm>
-            <a:off x="4279585" y="1463592"/>
-            <a:ext cx="2875183" cy="3082834"/>
+            <a:off x="3612739" y="1893524"/>
+            <a:ext cx="3658111" cy="1486107"/>
           </a:xfrm>
           <a:prstGeom prst="rect">
             <a:avLst/>
@@ -6785,7 +6481,7 @@
       </p:pic>
       <p:pic>
         <p:nvPicPr>
-          <p:cNvPr id="9" name="Imagem 8"/>
+          <p:cNvPr id="4" name="Imagem 3"/>
           <p:cNvPicPr>
             <a:picLocks noChangeAspect="1"/>
           </p:cNvPicPr>
@@ -6799,8 +6495,8 @@
         </p:blipFill>
         <p:spPr>
           <a:xfrm>
-            <a:off x="8183492" y="1463041"/>
-            <a:ext cx="3610479" cy="1857634"/>
+            <a:off x="7540777" y="1893524"/>
+            <a:ext cx="4429743" cy="3124636"/>
           </a:xfrm>
           <a:prstGeom prst="rect">
             <a:avLst/>
@@ -6810,20 +6506,20 @@
     </p:spTree>
     <p:extLst>
       <p:ext uri="{BB962C8B-B14F-4D97-AF65-F5344CB8AC3E}">
-        <p14:creationId xmlns:p14="http://schemas.microsoft.com/office/powerpoint/2010/main" val="524593019"/>
+        <p14:creationId xmlns:p14="http://schemas.microsoft.com/office/powerpoint/2010/main" val="3145480138"/>
       </p:ext>
     </p:extLst>
   </p:cSld>
   <p:clrMapOvr>
     <a:masterClrMapping/>
   </p:clrMapOvr>
-  <mc:AlternateContent xmlns:mc="http://schemas.openxmlformats.org/markup-compatibility/2006">
-    <mc:Choice xmlns:p14="http://schemas.microsoft.com/office/powerpoint/2010/main" Requires="p14">
+  <mc:AlternateContent xmlns:mc="http://schemas.openxmlformats.org/markup-compatibility/2006" xmlns:p14="http://schemas.microsoft.com/office/powerpoint/2010/main">
+    <mc:Choice Requires="p14">
       <p:transition spd="slow" p14:dur="1250">
         <p14:switch dir="r"/>
       </p:transition>
     </mc:Choice>
-    <mc:Fallback>
+    <mc:Fallback xmlns="">
       <p:transition spd="slow">
         <p:fade/>
       </p:transition>
@@ -6896,8 +6592,142 @@
         </p:nvSpPr>
         <p:spPr>
           <a:xfrm>
-            <a:off x="825137" y="679270"/>
-            <a:ext cx="10515600" cy="953588"/>
+            <a:off x="1294970" y="124097"/>
+            <a:ext cx="10515600" cy="692331"/>
+          </a:xfrm>
+          <a:prstGeom prst="rect">
+            <a:avLst/>
+          </a:prstGeom>
+          <a:effectLst>
+            <a:reflection endPos="0" dir="5400000" sy="-100000" algn="bl" rotWithShape="0"/>
+          </a:effectLst>
+          <a:scene3d>
+            <a:camera prst="orthographicFront"/>
+            <a:lightRig rig="threePt" dir="t"/>
+          </a:scene3d>
+          <a:sp3d prstMaterial="dkEdge">
+            <a:bevelB w="0"/>
+          </a:sp3d>
+        </p:spPr>
+        <p:txBody>
+          <a:bodyPr vert="horz" lIns="91440" tIns="45720" rIns="91440" bIns="45720" rtlCol="0" anchor="b">
+            <a:normAutofit fontScale="92500" lnSpcReduction="20000"/>
+          </a:bodyPr>
+          <a:lstStyle>
+            <a:lvl1pPr algn="ctr" defTabSz="914400" rtl="0" eaLnBrk="1" latinLnBrk="0" hangingPunct="1">
+              <a:lnSpc>
+                <a:spcPct val="90000"/>
+              </a:lnSpc>
+              <a:spcBef>
+                <a:spcPct val="0"/>
+              </a:spcBef>
+              <a:buNone/>
+              <a:defRPr sz="6000" kern="1200">
+                <a:solidFill>
+                  <a:schemeClr val="tx1"/>
+                </a:solidFill>
+                <a:latin typeface="+mj-lt"/>
+                <a:ea typeface="+mj-ea"/>
+                <a:cs typeface="+mj-cs"/>
+              </a:defRPr>
+            </a:lvl1pPr>
+          </a:lstStyle>
+          <a:p>
+            <a:r>
+              <a:rPr lang="pt-BR" b="1" dirty="0" smtClean="0">
+                <a:solidFill>
+                  <a:srgbClr val="FFFF00"/>
+                </a:solidFill>
+              </a:rPr>
+              <a:t>Services </a:t>
+            </a:r>
+          </a:p>
+        </p:txBody>
+      </p:sp>
+      <p:pic>
+        <p:nvPicPr>
+          <p:cNvPr id="4" name="Imagem 3"/>
+          <p:cNvPicPr>
+            <a:picLocks noChangeAspect="1"/>
+          </p:cNvPicPr>
+          <p:nvPr/>
+        </p:nvPicPr>
+        <p:blipFill>
+          <a:blip r:embed="rId3"/>
+          <a:stretch>
+            <a:fillRect/>
+          </a:stretch>
+        </p:blipFill>
+        <p:spPr>
+          <a:xfrm>
+            <a:off x="199548" y="470263"/>
+            <a:ext cx="4887007" cy="4297681"/>
+          </a:xfrm>
+          <a:prstGeom prst="rect">
+            <a:avLst/>
+          </a:prstGeom>
+        </p:spPr>
+      </p:pic>
+      <p:pic>
+        <p:nvPicPr>
+          <p:cNvPr id="8" name="Imagem 7"/>
+          <p:cNvPicPr>
+            <a:picLocks noChangeAspect="1"/>
+          </p:cNvPicPr>
+          <p:nvPr/>
+        </p:nvPicPr>
+        <p:blipFill>
+          <a:blip r:embed="rId4"/>
+          <a:stretch>
+            <a:fillRect/>
+          </a:stretch>
+        </p:blipFill>
+        <p:spPr>
+          <a:xfrm>
+            <a:off x="199548" y="4767944"/>
+            <a:ext cx="4887007" cy="1981679"/>
+          </a:xfrm>
+          <a:prstGeom prst="rect">
+            <a:avLst/>
+          </a:prstGeom>
+        </p:spPr>
+      </p:pic>
+      <p:pic>
+        <p:nvPicPr>
+          <p:cNvPr id="9" name="Imagem 8"/>
+          <p:cNvPicPr>
+            <a:picLocks noChangeAspect="1"/>
+          </p:cNvPicPr>
+          <p:nvPr/>
+        </p:nvPicPr>
+        <p:blipFill>
+          <a:blip r:embed="rId5"/>
+          <a:stretch>
+            <a:fillRect/>
+          </a:stretch>
+        </p:blipFill>
+        <p:spPr>
+          <a:xfrm>
+            <a:off x="8064633" y="764717"/>
+            <a:ext cx="3458058" cy="5325218"/>
+          </a:xfrm>
+          <a:prstGeom prst="rect">
+            <a:avLst/>
+          </a:prstGeom>
+        </p:spPr>
+      </p:pic>
+      <p:sp>
+        <p:nvSpPr>
+          <p:cNvPr id="10" name="Título 1"/>
+          <p:cNvSpPr txBox="1">
+            <a:spLocks/>
+          </p:cNvSpPr>
+          <p:nvPr/>
+        </p:nvSpPr>
+        <p:spPr>
+          <a:xfrm>
+            <a:off x="1072901" y="-222069"/>
+            <a:ext cx="2589053" cy="692331"/>
           </a:xfrm>
           <a:prstGeom prst="rect">
             <a:avLst/>
@@ -6938,86 +6768,95 @@
           </a:lstStyle>
           <a:p>
             <a:r>
-              <a:rPr lang="pt-BR" b="1" dirty="0" smtClean="0">
+              <a:rPr lang="pt-BR" sz="2800" b="1" dirty="0" smtClean="0">
                 <a:solidFill>
                   <a:srgbClr val="FFFF00"/>
                 </a:solidFill>
               </a:rPr>
-              <a:t>Service/</a:t>
-            </a:r>
-            <a:r>
-              <a:rPr lang="pt-BR" b="1" dirty="0" err="1" smtClean="0">
+              <a:t>Antes </a:t>
+            </a:r>
+          </a:p>
+        </p:txBody>
+      </p:sp>
+      <p:sp>
+        <p:nvSpPr>
+          <p:cNvPr id="11" name="Título 1"/>
+          <p:cNvSpPr txBox="1">
+            <a:spLocks/>
+          </p:cNvSpPr>
+          <p:nvPr/>
+        </p:nvSpPr>
+        <p:spPr>
+          <a:xfrm>
+            <a:off x="8499136" y="-38649"/>
+            <a:ext cx="2589053" cy="692331"/>
+          </a:xfrm>
+          <a:prstGeom prst="rect">
+            <a:avLst/>
+          </a:prstGeom>
+          <a:effectLst>
+            <a:reflection endPos="0" dir="5400000" sy="-100000" algn="bl" rotWithShape="0"/>
+          </a:effectLst>
+          <a:scene3d>
+            <a:camera prst="orthographicFront"/>
+            <a:lightRig rig="threePt" dir="t"/>
+          </a:scene3d>
+          <a:sp3d prstMaterial="dkEdge">
+            <a:bevelB w="0"/>
+          </a:sp3d>
+        </p:spPr>
+        <p:txBody>
+          <a:bodyPr vert="horz" lIns="91440" tIns="45720" rIns="91440" bIns="45720" rtlCol="0" anchor="b">
+            <a:normAutofit/>
+          </a:bodyPr>
+          <a:lstStyle>
+            <a:lvl1pPr algn="ctr" defTabSz="914400" rtl="0" eaLnBrk="1" latinLnBrk="0" hangingPunct="1">
+              <a:lnSpc>
+                <a:spcPct val="90000"/>
+              </a:lnSpc>
+              <a:spcBef>
+                <a:spcPct val="0"/>
+              </a:spcBef>
+              <a:buNone/>
+              <a:defRPr sz="6000" kern="1200">
+                <a:solidFill>
+                  <a:schemeClr val="tx1"/>
+                </a:solidFill>
+                <a:latin typeface="+mj-lt"/>
+                <a:ea typeface="+mj-ea"/>
+                <a:cs typeface="+mj-cs"/>
+              </a:defRPr>
+            </a:lvl1pPr>
+          </a:lstStyle>
+          <a:p>
+            <a:r>
+              <a:rPr lang="pt-BR" sz="2800" b="1" dirty="0" smtClean="0">
                 <a:solidFill>
                   <a:srgbClr val="FFFF00"/>
                 </a:solidFill>
               </a:rPr>
-              <a:t>Command</a:t>
-            </a:r>
-            <a:r>
-              <a:rPr lang="pt-BR" b="1" dirty="0" smtClean="0">
-                <a:solidFill>
-                  <a:srgbClr val="FFFF00"/>
-                </a:solidFill>
-              </a:rPr>
-              <a:t> </a:t>
-            </a:r>
-            <a:r>
-              <a:rPr lang="pt-BR" b="1" dirty="0" err="1" smtClean="0">
-                <a:solidFill>
-                  <a:srgbClr val="FFFF00"/>
-                </a:solidFill>
-              </a:rPr>
-              <a:t>Request</a:t>
-            </a:r>
-            <a:endParaRPr lang="pt-BR" b="1" dirty="0" smtClean="0">
-              <a:solidFill>
-                <a:srgbClr val="FFFF00"/>
-              </a:solidFill>
-            </a:endParaRPr>
-          </a:p>
-        </p:txBody>
-      </p:sp>
-      <p:pic>
-        <p:nvPicPr>
-          <p:cNvPr id="4" name="Imagem 3"/>
-          <p:cNvPicPr>
-            <a:picLocks noChangeAspect="1"/>
-          </p:cNvPicPr>
-          <p:nvPr/>
-        </p:nvPicPr>
-        <p:blipFill>
-          <a:blip r:embed="rId3"/>
-          <a:stretch>
-            <a:fillRect/>
-          </a:stretch>
-        </p:blipFill>
-        <p:spPr>
-          <a:xfrm>
-            <a:off x="4431421" y="1928857"/>
-            <a:ext cx="3057952" cy="2314898"/>
-          </a:xfrm>
-          <a:prstGeom prst="rect">
-            <a:avLst/>
-          </a:prstGeom>
-        </p:spPr>
-      </p:pic>
+              <a:t>Depois </a:t>
+            </a:r>
+          </a:p>
+        </p:txBody>
+      </p:sp>
     </p:spTree>
     <p:extLst>
       <p:ext uri="{BB962C8B-B14F-4D97-AF65-F5344CB8AC3E}">
-        <p14:creationId xmlns:p14="http://schemas.microsoft.com/office/powerpoint/2010/main" val="1369710829"/>
+        <p14:creationId xmlns:p14="http://schemas.microsoft.com/office/powerpoint/2010/main" val="1900257267"/>
       </p:ext>
     </p:extLst>
   </p:cSld>
   <p:clrMapOvr>
     <a:masterClrMapping/>
   </p:clrMapOvr>
-  <mc:AlternateContent xmlns:mc="http://schemas.openxmlformats.org/markup-compatibility/2006">
-    <mc:Choice xmlns:p14="http://schemas.microsoft.com/office/powerpoint/2010/main" Requires="p14">
+  <mc:AlternateContent xmlns:mc="http://schemas.openxmlformats.org/markup-compatibility/2006" xmlns:p14="http://schemas.microsoft.com/office/powerpoint/2010/main">
+    <mc:Choice Requires="p14">
       <p:transition spd="slow" p14:dur="1250">
         <p14:switch dir="r"/>
       </p:transition>
     </mc:Choice>
-    <mc:Fallback>
+    <mc:Fallback xmlns="">
       <p:transition spd="slow">
         <p:fade/>
       </p:transition>

</xml_diff>

<commit_message>
replicacao com kafka connector
</commit_message>
<xml_diff>
--- a/Apresentação2.pptx
+++ b/Apresentação2.pptx
@@ -5222,7 +5222,7 @@
         </p:nvSpPr>
         <p:spPr>
           <a:xfrm>
-            <a:off x="2694214" y="169815"/>
+            <a:off x="2581002" y="67703"/>
             <a:ext cx="7117080" cy="809897"/>
           </a:xfrm>
           <a:prstGeom prst="rect">
@@ -5276,7 +5276,7 @@
       </p:sp>
       <p:pic>
         <p:nvPicPr>
-          <p:cNvPr id="2" name="Imagem 1"/>
+          <p:cNvPr id="3" name="Imagem 2"/>
           <p:cNvPicPr>
             <a:picLocks noChangeAspect="1"/>
           </p:cNvPicPr>
@@ -5290,8 +5290,8 @@
         </p:blipFill>
         <p:spPr>
           <a:xfrm>
-            <a:off x="1528354" y="1047417"/>
-            <a:ext cx="9222377" cy="5601577"/>
+            <a:off x="1442388" y="1056943"/>
+            <a:ext cx="9307224" cy="5396107"/>
           </a:xfrm>
           <a:prstGeom prst="rect">
             <a:avLst/>

</xml_diff>

<commit_message>
ajuste do desenho da solucao
</commit_message>
<xml_diff>
--- a/Apresentação2.pptx
+++ b/Apresentação2.pptx
@@ -259,7 +259,7 @@
           <a:p>
             <a:fld id="{DF7CAEFB-97D1-495A-A570-66E8B46874CD}" type="datetimeFigureOut">
               <a:rPr lang="pt-BR" smtClean="0"/>
-              <a:t>23/03/2021</a:t>
+              <a:t>25/03/2021</a:t>
             </a:fld>
             <a:endParaRPr lang="pt-BR"/>
           </a:p>
@@ -429,7 +429,7 @@
           <a:p>
             <a:fld id="{DF7CAEFB-97D1-495A-A570-66E8B46874CD}" type="datetimeFigureOut">
               <a:rPr lang="pt-BR" smtClean="0"/>
-              <a:t>23/03/2021</a:t>
+              <a:t>25/03/2021</a:t>
             </a:fld>
             <a:endParaRPr lang="pt-BR"/>
           </a:p>
@@ -609,7 +609,7 @@
           <a:p>
             <a:fld id="{DF7CAEFB-97D1-495A-A570-66E8B46874CD}" type="datetimeFigureOut">
               <a:rPr lang="pt-BR" smtClean="0"/>
-              <a:t>23/03/2021</a:t>
+              <a:t>25/03/2021</a:t>
             </a:fld>
             <a:endParaRPr lang="pt-BR"/>
           </a:p>
@@ -779,7 +779,7 @@
           <a:p>
             <a:fld id="{DF7CAEFB-97D1-495A-A570-66E8B46874CD}" type="datetimeFigureOut">
               <a:rPr lang="pt-BR" smtClean="0"/>
-              <a:t>23/03/2021</a:t>
+              <a:t>25/03/2021</a:t>
             </a:fld>
             <a:endParaRPr lang="pt-BR"/>
           </a:p>
@@ -1025,7 +1025,7 @@
           <a:p>
             <a:fld id="{DF7CAEFB-97D1-495A-A570-66E8B46874CD}" type="datetimeFigureOut">
               <a:rPr lang="pt-BR" smtClean="0"/>
-              <a:t>23/03/2021</a:t>
+              <a:t>25/03/2021</a:t>
             </a:fld>
             <a:endParaRPr lang="pt-BR"/>
           </a:p>
@@ -1257,7 +1257,7 @@
           <a:p>
             <a:fld id="{DF7CAEFB-97D1-495A-A570-66E8B46874CD}" type="datetimeFigureOut">
               <a:rPr lang="pt-BR" smtClean="0"/>
-              <a:t>23/03/2021</a:t>
+              <a:t>25/03/2021</a:t>
             </a:fld>
             <a:endParaRPr lang="pt-BR"/>
           </a:p>
@@ -1624,7 +1624,7 @@
           <a:p>
             <a:fld id="{DF7CAEFB-97D1-495A-A570-66E8B46874CD}" type="datetimeFigureOut">
               <a:rPr lang="pt-BR" smtClean="0"/>
-              <a:t>23/03/2021</a:t>
+              <a:t>25/03/2021</a:t>
             </a:fld>
             <a:endParaRPr lang="pt-BR"/>
           </a:p>
@@ -1742,7 +1742,7 @@
           <a:p>
             <a:fld id="{DF7CAEFB-97D1-495A-A570-66E8B46874CD}" type="datetimeFigureOut">
               <a:rPr lang="pt-BR" smtClean="0"/>
-              <a:t>23/03/2021</a:t>
+              <a:t>25/03/2021</a:t>
             </a:fld>
             <a:endParaRPr lang="pt-BR"/>
           </a:p>
@@ -1837,7 +1837,7 @@
           <a:p>
             <a:fld id="{DF7CAEFB-97D1-495A-A570-66E8B46874CD}" type="datetimeFigureOut">
               <a:rPr lang="pt-BR" smtClean="0"/>
-              <a:t>23/03/2021</a:t>
+              <a:t>25/03/2021</a:t>
             </a:fld>
             <a:endParaRPr lang="pt-BR"/>
           </a:p>
@@ -2114,7 +2114,7 @@
           <a:p>
             <a:fld id="{DF7CAEFB-97D1-495A-A570-66E8B46874CD}" type="datetimeFigureOut">
               <a:rPr lang="pt-BR" smtClean="0"/>
-              <a:t>23/03/2021</a:t>
+              <a:t>25/03/2021</a:t>
             </a:fld>
             <a:endParaRPr lang="pt-BR"/>
           </a:p>
@@ -2367,7 +2367,7 @@
           <a:p>
             <a:fld id="{DF7CAEFB-97D1-495A-A570-66E8B46874CD}" type="datetimeFigureOut">
               <a:rPr lang="pt-BR" smtClean="0"/>
-              <a:t>23/03/2021</a:t>
+              <a:t>25/03/2021</a:t>
             </a:fld>
             <a:endParaRPr lang="pt-BR"/>
           </a:p>
@@ -2580,7 +2580,7 @@
           <a:p>
             <a:fld id="{DF7CAEFB-97D1-495A-A570-66E8B46874CD}" type="datetimeFigureOut">
               <a:rPr lang="pt-BR" smtClean="0"/>
-              <a:t>23/03/2021</a:t>
+              <a:t>25/03/2021</a:t>
             </a:fld>
             <a:endParaRPr lang="pt-BR"/>
           </a:p>
@@ -5276,7 +5276,7 @@
       </p:sp>
       <p:pic>
         <p:nvPicPr>
-          <p:cNvPr id="3" name="Imagem 2"/>
+          <p:cNvPr id="2" name="Imagem 1"/>
           <p:cNvPicPr>
             <a:picLocks noChangeAspect="1"/>
           </p:cNvPicPr>
@@ -5290,8 +5290,8 @@
         </p:blipFill>
         <p:spPr>
           <a:xfrm>
-            <a:off x="1442388" y="1056943"/>
-            <a:ext cx="9307224" cy="5396107"/>
+            <a:off x="1285203" y="1052181"/>
+            <a:ext cx="9621593" cy="5400870"/>
           </a:xfrm>
           <a:prstGeom prst="rect">
             <a:avLst/>

</xml_diff>